<commit_message>
update document : write setup and build section
</commit_message>
<xml_diff>
--- a/FRC Software Documentation.pptx
+++ b/FRC Software Documentation.pptx
@@ -5,13 +5,16 @@
     <p:sldMasterId id="2147483660" r:id="rId1"/>
   </p:sldMasterIdLst>
   <p:notesMasterIdLst>
-    <p:notesMasterId r:id="rId6"/>
+    <p:notesMasterId r:id="rId9"/>
   </p:notesMasterIdLst>
   <p:sldIdLst>
     <p:sldId id="256" r:id="rId2"/>
     <p:sldId id="257" r:id="rId3"/>
     <p:sldId id="258" r:id="rId4"/>
-    <p:sldId id="259" r:id="rId5"/>
+    <p:sldId id="260" r:id="rId5"/>
+    <p:sldId id="262" r:id="rId6"/>
+    <p:sldId id="259" r:id="rId7"/>
+    <p:sldId id="261" r:id="rId8"/>
   </p:sldIdLst>
   <p:sldSz cx="6858000" cy="9906000" type="A4"/>
   <p:notesSz cx="6858000" cy="9144000"/>
@@ -225,7 +228,7 @@
           <a:p>
             <a:fld id="{39598DF4-873B-4027-BEA5-BD5BA0BEB130}" type="datetimeFigureOut">
               <a:rPr lang="LID4096" smtClean="0"/>
-              <a:t>03/13/2025</a:t>
+              <a:t>3/14/25</a:t>
             </a:fld>
             <a:endParaRPr lang="LID4096"/>
           </a:p>
@@ -740,7 +743,7 @@
           <a:p>
             <a:fld id="{1F149D5C-2F02-48C9-B1CE-CEF83D395D23}" type="datetime1">
               <a:rPr lang="LID4096" smtClean="0"/>
-              <a:t>03/13/2025</a:t>
+              <a:t>3/14/25</a:t>
             </a:fld>
             <a:endParaRPr lang="LID4096"/>
           </a:p>
@@ -958,7 +961,7 @@
           <a:p>
             <a:fld id="{23799855-C666-4AC5-B654-CDE580277166}" type="datetime1">
               <a:rPr lang="LID4096" smtClean="0"/>
-              <a:t>03/13/2025</a:t>
+              <a:t>3/14/25</a:t>
             </a:fld>
             <a:endParaRPr lang="LID4096"/>
           </a:p>
@@ -1170,7 +1173,7 @@
           <a:p>
             <a:fld id="{A0845B5B-7C61-45DB-90B1-A4C452DFEECB}" type="datetime1">
               <a:rPr lang="LID4096" smtClean="0"/>
-              <a:t>03/13/2025</a:t>
+              <a:t>3/14/25</a:t>
             </a:fld>
             <a:endParaRPr lang="LID4096"/>
           </a:p>
@@ -1372,7 +1375,7 @@
           <a:p>
             <a:fld id="{56E5E50D-8CAC-4415-AD53-E890C1828379}" type="datetime1">
               <a:rPr lang="LID4096" smtClean="0"/>
-              <a:t>03/13/2025</a:t>
+              <a:t>3/14/25</a:t>
             </a:fld>
             <a:endParaRPr lang="LID4096"/>
           </a:p>
@@ -1618,7 +1621,7 @@
           <a:p>
             <a:fld id="{32441114-9AF2-43BC-A69B-4D5C6D649E6B}" type="datetime1">
               <a:rPr lang="LID4096" smtClean="0"/>
-              <a:t>03/13/2025</a:t>
+              <a:t>3/14/25</a:t>
             </a:fld>
             <a:endParaRPr lang="LID4096"/>
           </a:p>
@@ -1914,7 +1917,7 @@
           <a:p>
             <a:fld id="{CE931389-932C-4E82-BFF4-C506C7F2026B}" type="datetime1">
               <a:rPr lang="LID4096" smtClean="0"/>
-              <a:t>03/13/2025</a:t>
+              <a:t>3/14/25</a:t>
             </a:fld>
             <a:endParaRPr lang="LID4096"/>
           </a:p>
@@ -2345,7 +2348,7 @@
           <a:p>
             <a:fld id="{7E2531C9-ADDB-41B4-8762-9B101188FB4A}" type="datetime1">
               <a:rPr lang="LID4096" smtClean="0"/>
-              <a:t>03/13/2025</a:t>
+              <a:t>3/14/25</a:t>
             </a:fld>
             <a:endParaRPr lang="LID4096"/>
           </a:p>
@@ -2463,7 +2466,7 @@
           <a:p>
             <a:fld id="{0B0CF235-D811-4B0F-B470-65B8DCB1236E}" type="datetime1">
               <a:rPr lang="LID4096" smtClean="0"/>
-              <a:t>03/13/2025</a:t>
+              <a:t>3/14/25</a:t>
             </a:fld>
             <a:endParaRPr lang="LID4096"/>
           </a:p>
@@ -2558,7 +2561,7 @@
           <a:p>
             <a:fld id="{3A2F538D-ECD0-4412-B3BF-69D289CB38AE}" type="datetime1">
               <a:rPr lang="LID4096" smtClean="0"/>
-              <a:t>03/13/2025</a:t>
+              <a:t>3/14/25</a:t>
             </a:fld>
             <a:endParaRPr lang="LID4096"/>
           </a:p>
@@ -2867,7 +2870,7 @@
           <a:p>
             <a:fld id="{1A2A3422-6328-4515-BDC9-1D32D8FB6CAA}" type="datetime1">
               <a:rPr lang="LID4096" smtClean="0"/>
-              <a:t>03/13/2025</a:t>
+              <a:t>3/14/25</a:t>
             </a:fld>
             <a:endParaRPr lang="LID4096"/>
           </a:p>
@@ -3124,7 +3127,7 @@
           <a:p>
             <a:fld id="{AE1B2B6A-F891-47E2-B05C-9608ABA15048}" type="datetime1">
               <a:rPr lang="LID4096" smtClean="0"/>
-              <a:t>03/13/2025</a:t>
+              <a:t>3/14/25</a:t>
             </a:fld>
             <a:endParaRPr lang="LID4096"/>
           </a:p>
@@ -3369,7 +3372,7 @@
           <a:p>
             <a:fld id="{F071499B-7F2F-4F5F-B4BC-83B95EA0A306}" type="datetime1">
               <a:rPr lang="LID4096" smtClean="0"/>
-              <a:t>03/13/2025</a:t>
+              <a:t>3/14/25</a:t>
             </a:fld>
             <a:endParaRPr lang="LID4096"/>
           </a:p>
@@ -3942,7 +3945,7 @@
             <p:ph idx="1"/>
             <p:extLst>
               <p:ext uri="{D42A27DB-BD31-4B8C-83A1-F6EECF244321}">
-                <p14:modId xmlns:p14="http://schemas.microsoft.com/office/powerpoint/2010/main" val="401445783"/>
+                <p14:modId xmlns:p14="http://schemas.microsoft.com/office/powerpoint/2010/main" val="4221075101"/>
               </p:ext>
             </p:extLst>
           </p:nvPr>
@@ -4019,12 +4022,16 @@
                     <a:lstStyle/>
                     <a:p>
                       <a:r>
-                        <a:rPr lang="en-US" sz="2000" dirty="0" err="1"/>
-                        <a:t>DriverStation</a:t>
+                        <a:rPr lang="en-US" sz="2000" dirty="0"/>
+                        <a:t>Operator Console</a:t>
+                      </a:r>
+                      <a:r>
+                        <a:rPr lang="ja-JP" altLang="en-US" sz="2000"/>
+                        <a:t>の</a:t>
                       </a:r>
                       <a:r>
                         <a:rPr lang="ja-JP" altLang="en-US" sz="2000" dirty="0"/>
-                        <a:t>のセットアップ</a:t>
+                        <a:t>セットアップ</a:t>
                       </a:r>
                       <a:endParaRPr lang="LID4096" sz="2000" dirty="0"/>
                     </a:p>
@@ -4384,7 +4391,7 @@
         </p:spPr>
         <p:txBody>
           <a:bodyPr>
-            <a:normAutofit/>
+            <a:normAutofit lnSpcReduction="10000"/>
           </a:bodyPr>
           <a:lstStyle/>
           <a:p>
@@ -4824,7 +4831,7 @@
           <a:lstStyle/>
           <a:p>
             <a:r>
-              <a:rPr lang="ja-JP" altLang="en-US" dirty="0"/>
+              <a:rPr lang="en-US" dirty="0" err="1"/>
               <a:t>はじめに</a:t>
             </a:r>
             <a:endParaRPr lang="LID4096" dirty="0"/>
@@ -5266,7 +5273,2366 @@
     </p:spTree>
     <p:extLst>
       <p:ext uri="{BB962C8B-B14F-4D97-AF65-F5344CB8AC3E}">
+        <p14:creationId xmlns:p14="http://schemas.microsoft.com/office/powerpoint/2010/main" val="3573982132"/>
+      </p:ext>
+    </p:extLst>
+  </p:cSld>
+  <p:clrMapOvr>
+    <a:masterClrMapping/>
+  </p:clrMapOvr>
+</p:sld>
+</file>
+
+<file path=ppt/slides/slide5.xml><?xml version="1.0" encoding="utf-8"?>
+<p:sld xmlns:a="http://schemas.openxmlformats.org/drawingml/2006/main" xmlns:r="http://schemas.openxmlformats.org/officeDocument/2006/relationships" xmlns:p="http://schemas.openxmlformats.org/presentationml/2006/main">
+  <p:cSld>
+    <p:spTree>
+      <p:nvGrpSpPr>
+        <p:cNvPr id="1" name="">
+          <a:extLst>
+            <a:ext uri="{FF2B5EF4-FFF2-40B4-BE49-F238E27FC236}">
+              <a16:creationId xmlns:a16="http://schemas.microsoft.com/office/drawing/2014/main" id="{F8931A15-F644-DB73-327A-DAC617585AE5}"/>
+            </a:ext>
+          </a:extLst>
+        </p:cNvPr>
+        <p:cNvGrpSpPr/>
+        <p:nvPr/>
+      </p:nvGrpSpPr>
+      <p:grpSpPr>
+        <a:xfrm>
+          <a:off x="0" y="0"/>
+          <a:ext cx="0" cy="0"/>
+          <a:chOff x="0" y="0"/>
+          <a:chExt cx="0" cy="0"/>
+        </a:xfrm>
+      </p:grpSpPr>
+      <p:sp>
+        <p:nvSpPr>
+          <p:cNvPr id="2" name="タイトル 1">
+            <a:extLst>
+              <a:ext uri="{FF2B5EF4-FFF2-40B4-BE49-F238E27FC236}">
+                <a16:creationId xmlns:a16="http://schemas.microsoft.com/office/drawing/2014/main" id="{DE8D286E-E560-C7F2-D059-AC8B2B78C138}"/>
+              </a:ext>
+            </a:extLst>
+          </p:cNvPr>
+          <p:cNvSpPr>
+            <a:spLocks noGrp="1"/>
+          </p:cNvSpPr>
+          <p:nvPr>
+            <p:ph type="title"/>
+          </p:nvPr>
+        </p:nvSpPr>
+        <p:spPr>
+          <a:xfrm>
+            <a:off x="255494" y="406382"/>
+            <a:ext cx="6347011" cy="456315"/>
+          </a:xfrm>
+        </p:spPr>
+        <p:txBody>
+          <a:bodyPr>
+            <a:normAutofit fontScale="90000"/>
+          </a:bodyPr>
+          <a:lstStyle/>
+          <a:p>
+            <a:r>
+              <a:rPr lang="en-US" dirty="0"/>
+              <a:t>Operator </a:t>
+            </a:r>
+            <a:r>
+              <a:rPr lang="en-US" dirty="0" err="1"/>
+              <a:t>Consoleのセットアップ</a:t>
+            </a:r>
+            <a:endParaRPr lang="LID4096" dirty="0"/>
+          </a:p>
+        </p:txBody>
+      </p:sp>
+      <p:sp>
+        <p:nvSpPr>
+          <p:cNvPr id="4" name="スライド番号プレースホルダー 3">
+            <a:extLst>
+              <a:ext uri="{FF2B5EF4-FFF2-40B4-BE49-F238E27FC236}">
+                <a16:creationId xmlns:a16="http://schemas.microsoft.com/office/drawing/2014/main" id="{A605DC03-8CF0-D51D-9FA8-76DDF31F2AC2}"/>
+              </a:ext>
+            </a:extLst>
+          </p:cNvPr>
+          <p:cNvSpPr>
+            <a:spLocks noGrp="1"/>
+          </p:cNvSpPr>
+          <p:nvPr>
+            <p:ph type="sldNum" sz="quarter" idx="12"/>
+          </p:nvPr>
+        </p:nvSpPr>
+        <p:spPr>
+          <a:xfrm>
+            <a:off x="2657475" y="9399494"/>
+            <a:ext cx="1543050" cy="403412"/>
+          </a:xfrm>
+        </p:spPr>
+        <p:txBody>
+          <a:bodyPr/>
+          <a:lstStyle/>
+          <a:p>
+            <a:pPr algn="ctr"/>
+            <a:fld id="{1B7D4A80-9DE4-4993-AAB5-84F5BA439461}" type="slidenum">
+              <a:rPr lang="LID4096" sz="1400" smtClean="0"/>
+              <a:pPr algn="ctr"/>
+              <a:t>5</a:t>
+            </a:fld>
+            <a:endParaRPr lang="LID4096" sz="1400" dirty="0"/>
+          </a:p>
+        </p:txBody>
+      </p:sp>
+      <p:sp>
+        <p:nvSpPr>
+          <p:cNvPr id="6" name="コンテンツ プレースホルダー 5">
+            <a:extLst>
+              <a:ext uri="{FF2B5EF4-FFF2-40B4-BE49-F238E27FC236}">
+                <a16:creationId xmlns:a16="http://schemas.microsoft.com/office/drawing/2014/main" id="{E480CBF6-F224-A0E4-4F84-7C4D4FFD96AA}"/>
+              </a:ext>
+            </a:extLst>
+          </p:cNvPr>
+          <p:cNvSpPr>
+            <a:spLocks noGrp="1"/>
+          </p:cNvSpPr>
+          <p:nvPr>
+            <p:ph idx="1"/>
+          </p:nvPr>
+        </p:nvSpPr>
+        <p:spPr>
+          <a:xfrm>
+            <a:off x="317687" y="1009744"/>
+            <a:ext cx="6284818" cy="8651091"/>
+          </a:xfrm>
+        </p:spPr>
+        <p:txBody>
+          <a:bodyPr>
+            <a:normAutofit lnSpcReduction="10000"/>
+          </a:bodyPr>
+          <a:lstStyle/>
+          <a:p>
+            <a:pPr marL="0" indent="0">
+              <a:spcBef>
+                <a:spcPts val="1350"/>
+              </a:spcBef>
+              <a:buNone/>
+            </a:pPr>
+            <a:r>
+              <a:rPr lang="en-US" altLang="ja-JP" sz="2400" b="1" dirty="0"/>
+              <a:t>MATCH</a:t>
+            </a:r>
+            <a:r>
+              <a:rPr lang="ja-JP" altLang="en-US" sz="2400" b="1"/>
+              <a:t>時</a:t>
+            </a:r>
+            <a:r>
+              <a:rPr lang="en-US" altLang="ja-JP" sz="2400" b="1" dirty="0"/>
+              <a:t>,FIELD</a:t>
+            </a:r>
+            <a:r>
+              <a:rPr lang="ja-JP" altLang="en-US" sz="2400" b="1"/>
+              <a:t>に持ち込むもの</a:t>
+            </a:r>
+            <a:endParaRPr lang="en-US" altLang="ja-JP" sz="2400" b="1" dirty="0"/>
+          </a:p>
+          <a:p>
+            <a:r>
+              <a:rPr lang="ja-JP" altLang="en-US" sz="1600"/>
+              <a:t>ロボット本体とキャリー用カート</a:t>
+            </a:r>
+            <a:endParaRPr lang="en-US" altLang="ja-JP" sz="1600" dirty="0"/>
+          </a:p>
+          <a:p>
+            <a:r>
+              <a:rPr lang="en-US" altLang="ja-JP" sz="1600" dirty="0"/>
+              <a:t>Operator Console</a:t>
+            </a:r>
+            <a:r>
+              <a:rPr lang="ja-JP" altLang="en-US" sz="1600"/>
+              <a:t>用</a:t>
+            </a:r>
+            <a:r>
+              <a:rPr lang="en-US" altLang="ja-JP" sz="1600" dirty="0"/>
+              <a:t>PC</a:t>
+            </a:r>
+          </a:p>
+          <a:p>
+            <a:r>
+              <a:rPr lang="ja-JP" altLang="en-US" sz="1600"/>
+              <a:t>コントローラー２台</a:t>
+            </a:r>
+            <a:endParaRPr lang="en-US" altLang="ja-JP" sz="1600" dirty="0"/>
+          </a:p>
+          <a:p>
+            <a:r>
+              <a:rPr lang="ja-JP" altLang="en-US" sz="1600"/>
+              <a:t>必要な場合は</a:t>
+            </a:r>
+            <a:r>
+              <a:rPr lang="en-US" altLang="ja-JP" sz="1600" dirty="0"/>
+              <a:t>USB</a:t>
+            </a:r>
+            <a:r>
+              <a:rPr lang="ja-JP" altLang="en-US" sz="1600"/>
+              <a:t>ハブ</a:t>
+            </a:r>
+            <a:r>
+              <a:rPr lang="en-US" altLang="ja-JP" sz="1600" dirty="0"/>
+              <a:t>, USB-Ethernet</a:t>
+            </a:r>
+            <a:r>
+              <a:rPr lang="ja-JP" altLang="en-US" sz="1600"/>
+              <a:t>アダプタ</a:t>
+            </a:r>
+            <a:r>
+              <a:rPr lang="en-US" altLang="ja-JP" sz="1600" dirty="0"/>
+              <a:t>, PC</a:t>
+            </a:r>
+            <a:r>
+              <a:rPr lang="ja-JP" altLang="en-US" sz="1600"/>
+              <a:t>の充電器</a:t>
+            </a:r>
+            <a:endParaRPr lang="en-US" altLang="ja-JP" sz="1600" dirty="0"/>
+          </a:p>
+          <a:p>
+            <a:r>
+              <a:rPr lang="ja-JP" altLang="en-US" sz="1800" b="1"/>
+              <a:t>安全メガネ</a:t>
+            </a:r>
+            <a:r>
+              <a:rPr lang="en-US" altLang="ja-JP" sz="1800" b="1" dirty="0"/>
+              <a:t> (</a:t>
+            </a:r>
+            <a:r>
+              <a:rPr lang="ja-JP" altLang="en-US" sz="1800" b="1"/>
+              <a:t>重要！！</a:t>
+            </a:r>
+            <a:r>
+              <a:rPr lang="en-US" altLang="ja-JP" sz="1800" b="1" dirty="0"/>
+              <a:t>)</a:t>
+            </a:r>
+            <a:r>
+              <a:rPr lang="ja-JP" altLang="en-US" sz="1800" b="1"/>
+              <a:t> </a:t>
+            </a:r>
+            <a:r>
+              <a:rPr lang="en-US" altLang="ja-JP" sz="1800" b="1" dirty="0"/>
+              <a:t>DRIVER</a:t>
+            </a:r>
+            <a:r>
+              <a:rPr lang="ja-JP" altLang="en-US" sz="1800" b="1"/>
+              <a:t>も必要です</a:t>
+            </a:r>
+            <a:r>
+              <a:rPr lang="en-US" altLang="ja-JP" sz="1800" b="1" dirty="0"/>
+              <a:t>.</a:t>
+            </a:r>
+          </a:p>
+          <a:p>
+            <a:r>
+              <a:rPr lang="ja-JP" altLang="en-US" sz="1600" b="1"/>
+              <a:t>作戦会議・伝達用の紙やタブレット</a:t>
+            </a:r>
+            <a:r>
+              <a:rPr lang="en-US" altLang="ja-JP" sz="1600" b="1" dirty="0"/>
+              <a:t>, </a:t>
+            </a:r>
+            <a:r>
+              <a:rPr lang="ja-JP" altLang="en-US" sz="1600" b="1"/>
+              <a:t>コミュ力と英語力</a:t>
+            </a:r>
+            <a:endParaRPr lang="en-US" altLang="ja-JP" sz="1600" b="1" dirty="0"/>
+          </a:p>
+          <a:p>
+            <a:pPr marL="0" indent="0">
+              <a:spcBef>
+                <a:spcPts val="1350"/>
+              </a:spcBef>
+              <a:buNone/>
+            </a:pPr>
+            <a:r>
+              <a:rPr lang="en-US" altLang="ja-JP" sz="2400" b="1" dirty="0"/>
+              <a:t>MATCH</a:t>
+            </a:r>
+            <a:r>
+              <a:rPr lang="ja-JP" altLang="en-US" sz="2400" b="1"/>
+              <a:t>開始前に確認すること</a:t>
+            </a:r>
+            <a:endParaRPr lang="en-US" altLang="ja-JP" sz="2400" b="1" dirty="0"/>
+          </a:p>
+          <a:p>
+            <a:pPr>
+              <a:spcBef>
+                <a:spcPts val="1350"/>
+              </a:spcBef>
+            </a:pPr>
+            <a:r>
+              <a:rPr lang="ja-JP" altLang="en-US" sz="1600"/>
+              <a:t>ロボットのコードに実行時エラーがないこと</a:t>
+            </a:r>
+            <a:r>
+              <a:rPr lang="en-US" altLang="ja-JP" sz="1600" dirty="0"/>
+              <a:t>.</a:t>
+            </a:r>
+            <a:r>
+              <a:rPr lang="ja-JP" altLang="en-US" sz="1600"/>
+              <a:t>　</a:t>
+            </a:r>
+            <a:r>
+              <a:rPr lang="en-US" altLang="ja-JP" sz="1600" dirty="0"/>
+              <a:t>(</a:t>
+            </a:r>
+            <a:r>
+              <a:rPr lang="en-US" altLang="ja-JP" sz="1600" dirty="0" err="1"/>
+              <a:t>DriverStation</a:t>
+            </a:r>
+            <a:r>
+              <a:rPr lang="ja-JP" altLang="en-US" sz="1600"/>
+              <a:t>の</a:t>
+            </a:r>
+            <a:r>
+              <a:rPr lang="en-US" altLang="ja-JP" sz="1600" dirty="0"/>
+              <a:t>Robot Code</a:t>
+            </a:r>
+            <a:r>
+              <a:rPr lang="ja-JP" altLang="en-US" sz="1600"/>
+              <a:t>ランプが緑であることを確認してください</a:t>
+            </a:r>
+            <a:r>
+              <a:rPr lang="en-US" altLang="ja-JP" sz="1600" dirty="0"/>
+              <a:t>.)</a:t>
+            </a:r>
+          </a:p>
+          <a:p>
+            <a:pPr>
+              <a:spcBef>
+                <a:spcPts val="1350"/>
+              </a:spcBef>
+            </a:pPr>
+            <a:r>
+              <a:rPr lang="en-US" altLang="ja-JP" sz="1600" dirty="0"/>
+              <a:t>Robot Radio(VH-109)</a:t>
+            </a:r>
+            <a:r>
+              <a:rPr lang="ja-JP" altLang="en-US" sz="1600"/>
+              <a:t>が大会用に設定されていること</a:t>
+            </a:r>
+            <a:r>
+              <a:rPr lang="en-US" altLang="ja-JP" sz="1600" dirty="0"/>
+              <a:t>.(</a:t>
+            </a:r>
+            <a:r>
+              <a:rPr lang="ja-JP" altLang="en-US" sz="1600"/>
+              <a:t>大会側のマシンで設定する必要があります</a:t>
+            </a:r>
+            <a:r>
+              <a:rPr lang="en-US" altLang="ja-JP" sz="1600" dirty="0"/>
+              <a:t>. </a:t>
+            </a:r>
+            <a:r>
+              <a:rPr lang="ja-JP" altLang="en-US" sz="1600"/>
+              <a:t>練習用に旧型</a:t>
+            </a:r>
+            <a:r>
+              <a:rPr lang="en-US" altLang="ja-JP" sz="1600" dirty="0"/>
+              <a:t>Radio</a:t>
+            </a:r>
+            <a:r>
+              <a:rPr lang="ja-JP" altLang="en-US" sz="1600"/>
+              <a:t>を使用できます</a:t>
+            </a:r>
+            <a:r>
+              <a:rPr lang="en-US" altLang="ja-JP" sz="1600" dirty="0"/>
+              <a:t>)</a:t>
+            </a:r>
+          </a:p>
+          <a:p>
+            <a:pPr>
+              <a:spcBef>
+                <a:spcPts val="1350"/>
+              </a:spcBef>
+            </a:pPr>
+            <a:r>
+              <a:rPr lang="ja-JP" altLang="en-US" sz="1600"/>
+              <a:t>コントローラーが</a:t>
+            </a:r>
+            <a:r>
+              <a:rPr lang="en-US" altLang="ja-JP" sz="1600" dirty="0"/>
+              <a:t>USB</a:t>
+            </a:r>
+            <a:r>
+              <a:rPr lang="ja-JP" altLang="en-US" sz="1600"/>
+              <a:t>ポートに接続されていること</a:t>
+            </a:r>
+            <a:r>
+              <a:rPr lang="en-US" altLang="ja-JP" sz="1600" dirty="0"/>
+              <a:t>. Driver Station</a:t>
+            </a:r>
+            <a:r>
+              <a:rPr lang="ja-JP" altLang="en-US" sz="1600"/>
+              <a:t>で</a:t>
+            </a:r>
+            <a:r>
+              <a:rPr lang="en-US" altLang="ja-JP" sz="1600" dirty="0"/>
+              <a:t>Controller Port</a:t>
+            </a:r>
+            <a:r>
+              <a:rPr lang="ja-JP" altLang="en-US" sz="1600"/>
+              <a:t>とその番号を確認してください</a:t>
+            </a:r>
+            <a:r>
+              <a:rPr lang="en-US" altLang="ja-JP" sz="1600" dirty="0"/>
+              <a:t>. (Port 0=</a:t>
+            </a:r>
+            <a:r>
+              <a:rPr lang="ja-JP" altLang="en-US" sz="1600"/>
+              <a:t>スワーブ</a:t>
+            </a:r>
+            <a:r>
+              <a:rPr lang="en-US" altLang="ja-JP" sz="1600" dirty="0"/>
+              <a:t>, Port 1=</a:t>
+            </a:r>
+            <a:r>
+              <a:rPr lang="ja-JP" altLang="en-US" sz="1600"/>
+              <a:t>その他の機構</a:t>
+            </a:r>
+            <a:r>
+              <a:rPr lang="en-US" altLang="ja-JP" sz="1600" dirty="0"/>
+              <a:t>)</a:t>
+            </a:r>
+          </a:p>
+          <a:p>
+            <a:pPr>
+              <a:spcBef>
+                <a:spcPts val="1350"/>
+              </a:spcBef>
+            </a:pPr>
+            <a:r>
+              <a:rPr lang="en-US" altLang="ja-JP" sz="1600" dirty="0"/>
+              <a:t>Operator Console</a:t>
+            </a:r>
+            <a:r>
+              <a:rPr lang="ja-JP" altLang="en-US" sz="1600"/>
+              <a:t>が、</a:t>
+            </a:r>
+            <a:r>
+              <a:rPr lang="en-US" altLang="ja-JP" sz="1600" dirty="0"/>
+              <a:t>FMS</a:t>
+            </a:r>
+            <a:r>
+              <a:rPr lang="ja-JP" altLang="en-US" sz="1600"/>
+              <a:t>の有線</a:t>
+            </a:r>
+            <a:r>
+              <a:rPr lang="en-US" altLang="ja-JP" sz="1600" dirty="0"/>
+              <a:t>LAN</a:t>
+            </a:r>
+            <a:r>
+              <a:rPr lang="ja-JP" altLang="en-US" sz="1600"/>
+              <a:t>に接続されていること</a:t>
+            </a:r>
+            <a:r>
+              <a:rPr lang="en-US" altLang="ja-JP" sz="1600" dirty="0"/>
+              <a:t>.</a:t>
+            </a:r>
+          </a:p>
+          <a:p>
+            <a:pPr>
+              <a:spcBef>
+                <a:spcPts val="1350"/>
+              </a:spcBef>
+            </a:pPr>
+            <a:r>
+              <a:rPr lang="en-US" altLang="ja-JP" sz="1600" dirty="0"/>
+              <a:t>Operator Console </a:t>
+            </a:r>
+            <a:r>
+              <a:rPr lang="ja-JP" altLang="en-US" sz="1600"/>
+              <a:t>のダッシュボードは適切かどうか</a:t>
+            </a:r>
+            <a:r>
+              <a:rPr lang="en-US" altLang="ja-JP" sz="1600" dirty="0"/>
+              <a:t>. (Shuffleboard</a:t>
+            </a:r>
+            <a:r>
+              <a:rPr lang="ja-JP" altLang="en-US" sz="1600"/>
+              <a:t>向けにダッシュボードレイアウトを用意しています</a:t>
+            </a:r>
+            <a:r>
+              <a:rPr lang="en-US" altLang="ja-JP" sz="1600" dirty="0"/>
+              <a:t>. Shuffleboard</a:t>
+            </a:r>
+            <a:r>
+              <a:rPr lang="ja-JP" altLang="en-US" sz="1600"/>
+              <a:t>または</a:t>
+            </a:r>
+            <a:r>
+              <a:rPr lang="en" altLang="ja-JP" sz="1600" dirty="0"/>
+              <a:t>Elastic</a:t>
+            </a:r>
+            <a:r>
+              <a:rPr lang="ja-JP" altLang="en-US" sz="1600"/>
+              <a:t>を起動してください</a:t>
+            </a:r>
+            <a:r>
+              <a:rPr lang="en-US" altLang="ja-JP" sz="1600" dirty="0"/>
+              <a:t>.) </a:t>
+            </a:r>
+          </a:p>
+          <a:p>
+            <a:pPr>
+              <a:lnSpc>
+                <a:spcPct val="100000"/>
+              </a:lnSpc>
+              <a:spcBef>
+                <a:spcPts val="1350"/>
+              </a:spcBef>
+            </a:pPr>
+            <a:r>
+              <a:rPr lang="ja-JP" altLang="en-US" sz="1600"/>
+              <a:t>ロボットのバッテリー残量は適切かどうか</a:t>
+            </a:r>
+            <a:r>
+              <a:rPr lang="en-US" altLang="ja-JP" sz="1600" dirty="0"/>
+              <a:t>. (</a:t>
+            </a:r>
+            <a:r>
+              <a:rPr lang="ja-JP" altLang="en-US" sz="1600"/>
+              <a:t>フルチャージの状態だと</a:t>
+            </a:r>
+            <a:r>
+              <a:rPr lang="en-US" altLang="ja-JP" sz="1600" dirty="0"/>
+              <a:t>13V</a:t>
+            </a:r>
+            <a:r>
+              <a:rPr lang="ja-JP" altLang="en-US" sz="1600"/>
+              <a:t>程度になります</a:t>
+            </a:r>
+            <a:r>
+              <a:rPr lang="en-US" altLang="ja-JP" sz="1600" dirty="0"/>
+              <a:t>. </a:t>
+            </a:r>
+            <a:r>
+              <a:rPr lang="ja-JP" altLang="en-US" sz="1600"/>
+              <a:t>スワーブの駆動はバッテリーに負荷がかかりやすく</a:t>
+            </a:r>
+            <a:r>
+              <a:rPr lang="en-US" altLang="ja-JP" sz="1600" dirty="0"/>
+              <a:t>, </a:t>
+            </a:r>
+            <a:r>
+              <a:rPr lang="ja-JP" altLang="en-US" sz="1600"/>
+              <a:t>瞬発的に電圧が低下します</a:t>
+            </a:r>
+            <a:r>
+              <a:rPr lang="en-US" altLang="ja-JP" sz="1600" dirty="0"/>
+              <a:t>. </a:t>
+            </a:r>
+            <a:r>
+              <a:rPr lang="ja-JP" altLang="en-US" sz="1600"/>
+              <a:t>静止時</a:t>
+            </a:r>
+            <a:r>
+              <a:rPr lang="en-US" altLang="ja-JP" sz="1600" dirty="0"/>
+              <a:t>11.5V</a:t>
+            </a:r>
+            <a:r>
+              <a:rPr lang="ja-JP" altLang="en-US" sz="1600"/>
+              <a:t>を下回る場合は試合中にブラウンアウトする可能性があります</a:t>
+            </a:r>
+            <a:r>
+              <a:rPr lang="en-US" altLang="ja-JP" sz="1600" dirty="0"/>
+              <a:t>.)</a:t>
+            </a:r>
+          </a:p>
+          <a:p>
+            <a:pPr>
+              <a:lnSpc>
+                <a:spcPct val="100000"/>
+              </a:lnSpc>
+              <a:spcBef>
+                <a:spcPts val="1350"/>
+              </a:spcBef>
+            </a:pPr>
+            <a:r>
+              <a:rPr lang="en-US" altLang="ja-JP" sz="1600" dirty="0"/>
+              <a:t>A-Stop</a:t>
+            </a:r>
+            <a:r>
+              <a:rPr lang="ja-JP" altLang="en-US" sz="1600"/>
+              <a:t>の位置</a:t>
+            </a:r>
+            <a:r>
+              <a:rPr lang="en-US" altLang="ja-JP" sz="1600" dirty="0"/>
+              <a:t>. (Alliances</a:t>
+            </a:r>
+            <a:r>
+              <a:rPr lang="ja-JP" altLang="en-US" sz="1600"/>
+              <a:t>に</a:t>
+            </a:r>
+            <a:r>
+              <a:rPr lang="en-US" altLang="ja-JP" sz="1600" dirty="0"/>
+              <a:t>Auto</a:t>
+            </a:r>
+            <a:r>
+              <a:rPr lang="ja-JP" altLang="en-US" sz="1600"/>
+              <a:t>を使用しないことを要求された場合などには</a:t>
+            </a:r>
+            <a:r>
+              <a:rPr lang="en-US" altLang="ja-JP" sz="1600" dirty="0"/>
+              <a:t>, </a:t>
+            </a:r>
+            <a:r>
+              <a:rPr lang="ja-JP" altLang="en-US" sz="1600"/>
+              <a:t>開始後</a:t>
+            </a:r>
+            <a:r>
+              <a:rPr lang="en-US" altLang="ja-JP" sz="1600" dirty="0"/>
+              <a:t>A-Stop</a:t>
+            </a:r>
+            <a:r>
+              <a:rPr lang="ja-JP" altLang="en-US" sz="1600"/>
+              <a:t>で</a:t>
+            </a:r>
+            <a:r>
+              <a:rPr lang="en-US" altLang="ja-JP" sz="1600" dirty="0"/>
+              <a:t>Auto</a:t>
+            </a:r>
+            <a:r>
+              <a:rPr lang="ja-JP" altLang="en-US" sz="1600"/>
+              <a:t>を</a:t>
+            </a:r>
+            <a:r>
+              <a:rPr lang="en-US" altLang="ja-JP" sz="1600" dirty="0"/>
+              <a:t>Disable</a:t>
+            </a:r>
+            <a:r>
+              <a:rPr lang="ja-JP" altLang="en-US" sz="1600"/>
+              <a:t>にできます</a:t>
+            </a:r>
+            <a:r>
+              <a:rPr lang="en-US" altLang="ja-JP" sz="1600" dirty="0"/>
+              <a:t>)</a:t>
+            </a:r>
+          </a:p>
+          <a:p>
+            <a:pPr>
+              <a:lnSpc>
+                <a:spcPct val="100000"/>
+              </a:lnSpc>
+              <a:spcBef>
+                <a:spcPts val="1350"/>
+              </a:spcBef>
+            </a:pPr>
+            <a:r>
+              <a:rPr lang="ja-JP" altLang="en-US" sz="1800" b="1"/>
+              <a:t>安全メガネを装着していること</a:t>
+            </a:r>
+            <a:r>
+              <a:rPr lang="en-US" altLang="ja-JP" sz="1800" b="1" dirty="0"/>
+              <a:t>. </a:t>
+            </a:r>
+            <a:r>
+              <a:rPr lang="en-US" altLang="ja-JP" sz="1600" dirty="0"/>
+              <a:t>(</a:t>
+            </a:r>
+            <a:r>
+              <a:rPr lang="ja-JP" altLang="en-US" sz="1600"/>
+              <a:t>アクリル版はありますが</a:t>
+            </a:r>
+            <a:r>
+              <a:rPr lang="en-US" altLang="ja-JP" sz="1600" dirty="0"/>
+              <a:t>, </a:t>
+            </a:r>
+            <a:r>
+              <a:rPr lang="ja-JP" altLang="en-US" sz="1600"/>
+              <a:t>結構なスピードで鉄の塊が壁にぶつかるので</a:t>
+            </a:r>
+            <a:r>
+              <a:rPr lang="en-US" altLang="ja-JP" sz="1600" dirty="0"/>
+              <a:t>, </a:t>
+            </a:r>
+            <a:r>
+              <a:rPr lang="ja-JP" altLang="en-US" sz="1600"/>
+              <a:t>そこそこの衝撃と揺れもあります</a:t>
+            </a:r>
+            <a:r>
+              <a:rPr lang="en-US" altLang="ja-JP" sz="1600" dirty="0"/>
+              <a:t>. </a:t>
+            </a:r>
+            <a:r>
+              <a:rPr lang="ja-JP" altLang="en-US" sz="1600"/>
+              <a:t>どうか安全に</a:t>
+            </a:r>
+            <a:r>
+              <a:rPr lang="en-US" altLang="ja-JP" sz="1600" dirty="0"/>
+              <a:t>.)</a:t>
+            </a:r>
+          </a:p>
+        </p:txBody>
+      </p:sp>
+    </p:spTree>
+    <p:extLst>
+      <p:ext uri="{BB962C8B-B14F-4D97-AF65-F5344CB8AC3E}">
+        <p14:creationId xmlns:p14="http://schemas.microsoft.com/office/powerpoint/2010/main" val="2096060909"/>
+      </p:ext>
+    </p:extLst>
+  </p:cSld>
+  <p:clrMapOvr>
+    <a:masterClrMapping/>
+  </p:clrMapOvr>
+</p:sld>
+</file>
+
+<file path=ppt/slides/slide6.xml><?xml version="1.0" encoding="utf-8"?>
+<p:sld xmlns:a="http://schemas.openxmlformats.org/drawingml/2006/main" xmlns:r="http://schemas.openxmlformats.org/officeDocument/2006/relationships" xmlns:p="http://schemas.openxmlformats.org/presentationml/2006/main">
+  <p:cSld>
+    <p:spTree>
+      <p:nvGrpSpPr>
+        <p:cNvPr id="1" name="">
+          <a:extLst>
+            <a:ext uri="{FF2B5EF4-FFF2-40B4-BE49-F238E27FC236}">
+              <a16:creationId xmlns:a16="http://schemas.microsoft.com/office/drawing/2014/main" id="{F8931A15-F644-DB73-327A-DAC617585AE5}"/>
+            </a:ext>
+          </a:extLst>
+        </p:cNvPr>
+        <p:cNvGrpSpPr/>
+        <p:nvPr/>
+      </p:nvGrpSpPr>
+      <p:grpSpPr>
+        <a:xfrm>
+          <a:off x="0" y="0"/>
+          <a:ext cx="0" cy="0"/>
+          <a:chOff x="0" y="0"/>
+          <a:chExt cx="0" cy="0"/>
+        </a:xfrm>
+      </p:grpSpPr>
+      <p:sp>
+        <p:nvSpPr>
+          <p:cNvPr id="2" name="タイトル 1">
+            <a:extLst>
+              <a:ext uri="{FF2B5EF4-FFF2-40B4-BE49-F238E27FC236}">
+                <a16:creationId xmlns:a16="http://schemas.microsoft.com/office/drawing/2014/main" id="{DE8D286E-E560-C7F2-D059-AC8B2B78C138}"/>
+              </a:ext>
+            </a:extLst>
+          </p:cNvPr>
+          <p:cNvSpPr>
+            <a:spLocks noGrp="1"/>
+          </p:cNvSpPr>
+          <p:nvPr>
+            <p:ph type="title"/>
+          </p:nvPr>
+        </p:nvSpPr>
+        <p:spPr>
+          <a:xfrm>
+            <a:off x="255494" y="406382"/>
+            <a:ext cx="6347011" cy="456315"/>
+          </a:xfrm>
+        </p:spPr>
+        <p:txBody>
+          <a:bodyPr>
+            <a:normAutofit fontScale="90000"/>
+          </a:bodyPr>
+          <a:lstStyle/>
+          <a:p>
+            <a:r>
+              <a:rPr lang="ja-JP" altLang="en-US"/>
+              <a:t>コードのビルド</a:t>
+            </a:r>
+            <a:r>
+              <a:rPr lang="en-US" altLang="ja-JP" dirty="0"/>
+              <a:t>/</a:t>
+            </a:r>
+            <a:r>
+              <a:rPr lang="ja-JP" altLang="en-US"/>
+              <a:t>デプロイ</a:t>
+            </a:r>
+            <a:endParaRPr lang="LID4096" dirty="0"/>
+          </a:p>
+        </p:txBody>
+      </p:sp>
+      <p:sp>
+        <p:nvSpPr>
+          <p:cNvPr id="4" name="スライド番号プレースホルダー 3">
+            <a:extLst>
+              <a:ext uri="{FF2B5EF4-FFF2-40B4-BE49-F238E27FC236}">
+                <a16:creationId xmlns:a16="http://schemas.microsoft.com/office/drawing/2014/main" id="{A605DC03-8CF0-D51D-9FA8-76DDF31F2AC2}"/>
+              </a:ext>
+            </a:extLst>
+          </p:cNvPr>
+          <p:cNvSpPr>
+            <a:spLocks noGrp="1"/>
+          </p:cNvSpPr>
+          <p:nvPr>
+            <p:ph type="sldNum" sz="quarter" idx="12"/>
+          </p:nvPr>
+        </p:nvSpPr>
+        <p:spPr>
+          <a:xfrm>
+            <a:off x="2657475" y="9399494"/>
+            <a:ext cx="1543050" cy="403412"/>
+          </a:xfrm>
+        </p:spPr>
+        <p:txBody>
+          <a:bodyPr/>
+          <a:lstStyle/>
+          <a:p>
+            <a:pPr algn="ctr"/>
+            <a:fld id="{1B7D4A80-9DE4-4993-AAB5-84F5BA439461}" type="slidenum">
+              <a:rPr lang="LID4096" sz="1400" smtClean="0"/>
+              <a:pPr algn="ctr"/>
+              <a:t>6</a:t>
+            </a:fld>
+            <a:endParaRPr lang="LID4096" sz="1400" dirty="0"/>
+          </a:p>
+        </p:txBody>
+      </p:sp>
+      <p:sp>
+        <p:nvSpPr>
+          <p:cNvPr id="6" name="コンテンツ プレースホルダー 5">
+            <a:extLst>
+              <a:ext uri="{FF2B5EF4-FFF2-40B4-BE49-F238E27FC236}">
+                <a16:creationId xmlns:a16="http://schemas.microsoft.com/office/drawing/2014/main" id="{E480CBF6-F224-A0E4-4F84-7C4D4FFD96AA}"/>
+              </a:ext>
+            </a:extLst>
+          </p:cNvPr>
+          <p:cNvSpPr>
+            <a:spLocks noGrp="1"/>
+          </p:cNvSpPr>
+          <p:nvPr>
+            <p:ph idx="1"/>
+          </p:nvPr>
+        </p:nvSpPr>
+        <p:spPr>
+          <a:xfrm>
+            <a:off x="317687" y="1009745"/>
+            <a:ext cx="6284818" cy="3152792"/>
+          </a:xfrm>
+        </p:spPr>
+        <p:txBody>
+          <a:bodyPr>
+            <a:normAutofit/>
+          </a:bodyPr>
+          <a:lstStyle/>
+          <a:p>
+            <a:pPr marL="0" indent="0">
+              <a:buNone/>
+            </a:pPr>
+            <a:r>
+              <a:rPr lang="en-US" altLang="ja-JP" sz="1800" dirty="0"/>
+              <a:t>GitHub</a:t>
+            </a:r>
+            <a:r>
+              <a:rPr lang="ja-JP" altLang="en-US" sz="1800"/>
+              <a:t>上のソースコードを</a:t>
+            </a:r>
+            <a:r>
+              <a:rPr lang="en-US" altLang="ja-JP" sz="1800" dirty="0"/>
+              <a:t>Clone</a:t>
+            </a:r>
+            <a:r>
+              <a:rPr lang="ja-JP" altLang="en-US" sz="1800"/>
+              <a:t>していない場合</a:t>
+            </a:r>
+            <a:endParaRPr lang="en-US" altLang="ja-JP" sz="1800" dirty="0"/>
+          </a:p>
+          <a:p>
+            <a:pPr marL="0" indent="0">
+              <a:buNone/>
+            </a:pPr>
+            <a:r>
+              <a:rPr lang="en-US" altLang="ja-JP" sz="1200" dirty="0">
+                <a:solidFill>
+                  <a:schemeClr val="bg1"/>
+                </a:solidFill>
+                <a:highlight>
+                  <a:srgbClr val="1E1E1E"/>
+                </a:highlight>
+                <a:latin typeface="Fira Code" panose="020B0809050000020004" pitchFamily="49" charset="0"/>
+                <a:ea typeface="Fira Code" panose="020B0809050000020004" pitchFamily="49" charset="0"/>
+                <a:cs typeface="Fira Code" panose="020B0809050000020004" pitchFamily="49" charset="0"/>
+              </a:rPr>
+              <a:t>git clone https://</a:t>
+            </a:r>
+            <a:r>
+              <a:rPr lang="en-US" altLang="ja-JP" sz="1200" dirty="0" err="1">
+                <a:solidFill>
+                  <a:schemeClr val="bg1"/>
+                </a:solidFill>
+                <a:highlight>
+                  <a:srgbClr val="1E1E1E"/>
+                </a:highlight>
+                <a:latin typeface="Fira Code" panose="020B0809050000020004" pitchFamily="49" charset="0"/>
+                <a:ea typeface="Fira Code" panose="020B0809050000020004" pitchFamily="49" charset="0"/>
+                <a:cs typeface="Fira Code" panose="020B0809050000020004" pitchFamily="49" charset="0"/>
+              </a:rPr>
+              <a:t>github.com</a:t>
+            </a:r>
+            <a:r>
+              <a:rPr lang="en-US" altLang="ja-JP" sz="1200" dirty="0">
+                <a:solidFill>
+                  <a:schemeClr val="bg1"/>
+                </a:solidFill>
+                <a:highlight>
+                  <a:srgbClr val="1E1E1E"/>
+                </a:highlight>
+                <a:latin typeface="Fira Code" panose="020B0809050000020004" pitchFamily="49" charset="0"/>
+                <a:ea typeface="Fira Code" panose="020B0809050000020004" pitchFamily="49" charset="0"/>
+                <a:cs typeface="Fira Code" panose="020B0809050000020004" pitchFamily="49" charset="0"/>
+              </a:rPr>
+              <a:t>/</a:t>
+            </a:r>
+            <a:r>
+              <a:rPr lang="en-US" altLang="ja-JP" sz="1200" dirty="0" err="1">
+                <a:solidFill>
+                  <a:schemeClr val="bg1"/>
+                </a:solidFill>
+                <a:highlight>
+                  <a:srgbClr val="1E1E1E"/>
+                </a:highlight>
+                <a:latin typeface="Fira Code" panose="020B0809050000020004" pitchFamily="49" charset="0"/>
+                <a:ea typeface="Fira Code" panose="020B0809050000020004" pitchFamily="49" charset="0"/>
+                <a:cs typeface="Fira Code" panose="020B0809050000020004" pitchFamily="49" charset="0"/>
+              </a:rPr>
+              <a:t>poc</a:t>
+            </a:r>
+            <a:r>
+              <a:rPr lang="en-US" altLang="ja-JP" sz="1200" dirty="0">
+                <a:solidFill>
+                  <a:schemeClr val="bg1"/>
+                </a:solidFill>
+                <a:highlight>
+                  <a:srgbClr val="1E1E1E"/>
+                </a:highlight>
+                <a:latin typeface="Fira Code" panose="020B0809050000020004" pitchFamily="49" charset="0"/>
+                <a:ea typeface="Fira Code" panose="020B0809050000020004" pitchFamily="49" charset="0"/>
+                <a:cs typeface="Fira Code" panose="020B0809050000020004" pitchFamily="49" charset="0"/>
+              </a:rPr>
+              <a:t>-nonprofit/RobotCode2025.git</a:t>
+            </a:r>
+            <a:r>
+              <a:rPr lang="en-US" altLang="ja-JP" sz="1200" dirty="0">
+                <a:solidFill>
+                  <a:schemeClr val="bg1"/>
+                </a:solidFill>
+                <a:latin typeface="Fira Code" panose="020B0809050000020004" pitchFamily="49" charset="0"/>
+                <a:ea typeface="Fira Code" panose="020B0809050000020004" pitchFamily="49" charset="0"/>
+                <a:cs typeface="Fira Code" panose="020B0809050000020004" pitchFamily="49" charset="0"/>
+              </a:rPr>
+              <a:t> </a:t>
+            </a:r>
+            <a:r>
+              <a:rPr lang="ja-JP" altLang="en-US" sz="1200">
+                <a:latin typeface="+mn-ea"/>
+                <a:cs typeface="Fira Code" panose="020B0809050000020004" pitchFamily="49" charset="0"/>
+              </a:rPr>
+              <a:t>を実行</a:t>
+            </a:r>
+            <a:endParaRPr lang="en-US" altLang="ja-JP" sz="1200" dirty="0">
+              <a:latin typeface="+mn-ea"/>
+              <a:cs typeface="Fira Code" panose="020B0809050000020004" pitchFamily="49" charset="0"/>
+            </a:endParaRPr>
+          </a:p>
+          <a:p>
+            <a:pPr marL="0" indent="0">
+              <a:buNone/>
+            </a:pPr>
+            <a:r>
+              <a:rPr lang="ja-JP" altLang="en-US" sz="1600">
+                <a:latin typeface="+mn-ea"/>
+                <a:cs typeface="Fira Code" panose="020B0809050000020004" pitchFamily="49" charset="0"/>
+              </a:rPr>
+              <a:t>または</a:t>
+            </a:r>
+            <a:r>
+              <a:rPr lang="en-US" altLang="ja-JP" sz="1600" dirty="0">
+                <a:latin typeface="+mn-ea"/>
+                <a:cs typeface="Fira Code" panose="020B0809050000020004" pitchFamily="49" charset="0"/>
+              </a:rPr>
+              <a:t>IDE</a:t>
+            </a:r>
+            <a:r>
+              <a:rPr lang="ja-JP" altLang="en-US" sz="1600">
+                <a:latin typeface="+mn-ea"/>
+                <a:cs typeface="Fira Code" panose="020B0809050000020004" pitchFamily="49" charset="0"/>
+              </a:rPr>
+              <a:t>等のクローン機能を利用してリポジトリをクローンしてください</a:t>
+            </a:r>
+            <a:r>
+              <a:rPr lang="en-US" altLang="ja-JP" sz="1600" dirty="0">
+                <a:latin typeface="+mn-ea"/>
+                <a:cs typeface="Fira Code" panose="020B0809050000020004" pitchFamily="49" charset="0"/>
+              </a:rPr>
+              <a:t>.</a:t>
+            </a:r>
+          </a:p>
+          <a:p>
+            <a:pPr marL="0" indent="0">
+              <a:buNone/>
+            </a:pPr>
+            <a:r>
+              <a:rPr lang="ja-JP" altLang="en-US" sz="1800" b="1">
+                <a:latin typeface="+mn-ea"/>
+                <a:cs typeface="Fira Code" panose="020B0809050000020004" pitchFamily="49" charset="0"/>
+              </a:rPr>
+              <a:t>ソースコードの更新</a:t>
+            </a:r>
+            <a:endParaRPr lang="en-US" altLang="ja-JP" sz="1800" b="1" dirty="0">
+              <a:latin typeface="+mn-ea"/>
+              <a:cs typeface="Fira Code" panose="020B0809050000020004" pitchFamily="49" charset="0"/>
+            </a:endParaRPr>
+          </a:p>
+          <a:p>
+            <a:pPr marL="0" indent="0">
+              <a:buNone/>
+            </a:pPr>
+            <a:r>
+              <a:rPr lang="ja-JP" altLang="en-US" sz="1600">
+                <a:latin typeface="+mn-ea"/>
+                <a:cs typeface="Fira Code" panose="020B0809050000020004" pitchFamily="49" charset="0"/>
+              </a:rPr>
+              <a:t>ブランチ名</a:t>
+            </a:r>
+            <a:r>
+              <a:rPr lang="en-US" altLang="ja-JP" sz="1600" dirty="0">
+                <a:latin typeface="+mn-ea"/>
+                <a:cs typeface="Fira Code" panose="020B0809050000020004" pitchFamily="49" charset="0"/>
+              </a:rPr>
+              <a:t>(</a:t>
+            </a:r>
+            <a:r>
+              <a:rPr lang="ja-JP" altLang="en-US" sz="1600">
+                <a:latin typeface="+mn-ea"/>
+                <a:cs typeface="Fira Code" panose="020B0809050000020004" pitchFamily="49" charset="0"/>
+              </a:rPr>
+              <a:t>ここでは</a:t>
+            </a:r>
+            <a:r>
+              <a:rPr lang="en-US" altLang="ja-JP" sz="1600" dirty="0">
+                <a:latin typeface="+mn-ea"/>
+                <a:cs typeface="Fira Code" panose="020B0809050000020004" pitchFamily="49" charset="0"/>
+              </a:rPr>
+              <a:t>master)</a:t>
+            </a:r>
+            <a:r>
+              <a:rPr lang="ja-JP" altLang="en-US" sz="1600">
+                <a:latin typeface="+mn-ea"/>
+                <a:cs typeface="Fira Code" panose="020B0809050000020004" pitchFamily="49" charset="0"/>
+              </a:rPr>
+              <a:t>の横に↙️アイコンがある場合は</a:t>
+            </a:r>
+            <a:r>
+              <a:rPr lang="en-US" altLang="ja-JP" sz="1600" dirty="0">
+                <a:latin typeface="+mn-ea"/>
+                <a:cs typeface="Fira Code" panose="020B0809050000020004" pitchFamily="49" charset="0"/>
+              </a:rPr>
+              <a:t>, GitHub</a:t>
+            </a:r>
+            <a:r>
+              <a:rPr lang="ja-JP" altLang="en-US" sz="1600">
+                <a:latin typeface="+mn-ea"/>
+                <a:cs typeface="Fira Code" panose="020B0809050000020004" pitchFamily="49" charset="0"/>
+              </a:rPr>
+              <a:t>上に新しいバージョンがあります</a:t>
+            </a:r>
+            <a:r>
+              <a:rPr lang="en-US" altLang="ja-JP" sz="1600" dirty="0">
+                <a:latin typeface="+mn-ea"/>
+                <a:cs typeface="Fira Code" panose="020B0809050000020004" pitchFamily="49" charset="0"/>
+              </a:rPr>
+              <a:t>.</a:t>
+            </a:r>
+          </a:p>
+          <a:p>
+            <a:pPr marL="0" indent="0">
+              <a:buNone/>
+            </a:pPr>
+            <a:r>
+              <a:rPr lang="ja-JP" altLang="en-US" sz="1600">
+                <a:latin typeface="+mn-ea"/>
+                <a:cs typeface="Fira Code" panose="020B0809050000020004" pitchFamily="49" charset="0"/>
+              </a:rPr>
+              <a:t>その場合は、プロジェクトの更新を選択して、ローカルに変更をマージしてください</a:t>
+            </a:r>
+            <a:r>
+              <a:rPr lang="en-US" altLang="ja-JP" sz="1600" dirty="0">
+                <a:latin typeface="+mn-ea"/>
+                <a:cs typeface="Fira Code" panose="020B0809050000020004" pitchFamily="49" charset="0"/>
+              </a:rPr>
+              <a:t>.</a:t>
+            </a:r>
+          </a:p>
+        </p:txBody>
+      </p:sp>
+      <p:pic>
+        <p:nvPicPr>
+          <p:cNvPr id="5" name="図 4">
+            <a:extLst>
+              <a:ext uri="{FF2B5EF4-FFF2-40B4-BE49-F238E27FC236}">
+                <a16:creationId xmlns:a16="http://schemas.microsoft.com/office/drawing/2014/main" id="{EF4E5A37-276A-64D4-19C4-BE0C843385DD}"/>
+              </a:ext>
+            </a:extLst>
+          </p:cNvPr>
+          <p:cNvPicPr>
+            <a:picLocks noChangeAspect="1"/>
+          </p:cNvPicPr>
+          <p:nvPr/>
+        </p:nvPicPr>
+        <p:blipFill>
+          <a:blip r:embed="rId2"/>
+          <a:stretch>
+            <a:fillRect/>
+          </a:stretch>
+        </p:blipFill>
+        <p:spPr>
+          <a:xfrm>
+            <a:off x="4200525" y="3672494"/>
+            <a:ext cx="2401980" cy="382133"/>
+          </a:xfrm>
+          <a:prstGeom prst="rect">
+            <a:avLst/>
+          </a:prstGeom>
+        </p:spPr>
+      </p:pic>
+      <p:pic>
+        <p:nvPicPr>
+          <p:cNvPr id="7" name="図 6">
+            <a:extLst>
+              <a:ext uri="{FF2B5EF4-FFF2-40B4-BE49-F238E27FC236}">
+                <a16:creationId xmlns:a16="http://schemas.microsoft.com/office/drawing/2014/main" id="{E5681E94-4655-A48B-376B-853E546BC8B5}"/>
+              </a:ext>
+            </a:extLst>
+          </p:cNvPr>
+          <p:cNvPicPr>
+            <a:picLocks noChangeAspect="1"/>
+          </p:cNvPicPr>
+          <p:nvPr/>
+        </p:nvPicPr>
+        <p:blipFill>
+          <a:blip r:embed="rId3"/>
+          <a:stretch>
+            <a:fillRect/>
+          </a:stretch>
+        </p:blipFill>
+        <p:spPr>
+          <a:xfrm>
+            <a:off x="4123657" y="4162536"/>
+            <a:ext cx="2478848" cy="2168992"/>
+          </a:xfrm>
+          <a:prstGeom prst="rect">
+            <a:avLst/>
+          </a:prstGeom>
+        </p:spPr>
+      </p:pic>
+      <p:sp>
+        <p:nvSpPr>
+          <p:cNvPr id="9" name="テキスト ボックス 8">
+            <a:extLst>
+              <a:ext uri="{FF2B5EF4-FFF2-40B4-BE49-F238E27FC236}">
+                <a16:creationId xmlns:a16="http://schemas.microsoft.com/office/drawing/2014/main" id="{09CEF3D6-EA3F-D92C-BC55-4C2FF83C062E}"/>
+              </a:ext>
+            </a:extLst>
+          </p:cNvPr>
+          <p:cNvSpPr txBox="1"/>
+          <p:nvPr/>
+        </p:nvSpPr>
+        <p:spPr>
+          <a:xfrm>
+            <a:off x="317687" y="3530795"/>
+            <a:ext cx="3805970" cy="2867836"/>
+          </a:xfrm>
+          <a:prstGeom prst="rect">
+            <a:avLst/>
+          </a:prstGeom>
+          <a:noFill/>
+        </p:spPr>
+        <p:txBody>
+          <a:bodyPr wrap="square">
+            <a:spAutoFit/>
+          </a:bodyPr>
+          <a:lstStyle/>
+          <a:p>
+            <a:pPr marL="0" marR="0" lvl="0" indent="0" algn="l" defTabSz="685800" rtl="0" eaLnBrk="1" fontAlgn="auto" latinLnBrk="0" hangingPunct="1">
+              <a:lnSpc>
+                <a:spcPct val="90000"/>
+              </a:lnSpc>
+              <a:spcBef>
+                <a:spcPts val="750"/>
+              </a:spcBef>
+              <a:spcAft>
+                <a:spcPts val="0"/>
+              </a:spcAft>
+              <a:buClrTx/>
+              <a:buSzTx/>
+              <a:buFont typeface="Arial" panose="020B0604020202020204" pitchFamily="34" charset="0"/>
+              <a:buNone/>
+              <a:tabLst/>
+              <a:defRPr/>
+            </a:pPr>
+            <a:r>
+              <a:rPr kumimoji="0" lang="ja-JP" altLang="en-US" sz="1800" b="1" i="0" u="none" strike="noStrike" kern="1200" cap="none" spc="0" normalizeH="0" baseline="0" noProof="0">
+                <a:ln>
+                  <a:noFill/>
+                </a:ln>
+                <a:solidFill>
+                  <a:prstClr val="black"/>
+                </a:solidFill>
+                <a:effectLst/>
+                <a:uLnTx/>
+                <a:uFillTx/>
+                <a:latin typeface="+mn-ea"/>
+                <a:ea typeface="Noto Sans JP"/>
+                <a:cs typeface="Fira Code" panose="020B0809050000020004" pitchFamily="49" charset="0"/>
+              </a:rPr>
+              <a:t>ビルドタスク</a:t>
+            </a:r>
+            <a:endParaRPr kumimoji="0" lang="en-US" altLang="ja-JP" sz="1800" b="1" i="0" u="none" strike="noStrike" kern="1200" cap="none" spc="0" normalizeH="0" baseline="0" noProof="0" dirty="0">
+              <a:ln>
+                <a:noFill/>
+              </a:ln>
+              <a:solidFill>
+                <a:prstClr val="black"/>
+              </a:solidFill>
+              <a:effectLst/>
+              <a:uLnTx/>
+              <a:uFillTx/>
+              <a:latin typeface="+mn-ea"/>
+              <a:ea typeface="Noto Sans JP"/>
+              <a:cs typeface="Fira Code" panose="020B0809050000020004" pitchFamily="49" charset="0"/>
+            </a:endParaRPr>
+          </a:p>
+          <a:p>
+            <a:pPr marL="0" marR="0" lvl="0" indent="0" algn="l" defTabSz="685800" rtl="0" eaLnBrk="1" fontAlgn="auto" latinLnBrk="0" hangingPunct="1">
+              <a:lnSpc>
+                <a:spcPct val="90000"/>
+              </a:lnSpc>
+              <a:spcBef>
+                <a:spcPts val="750"/>
+              </a:spcBef>
+              <a:spcAft>
+                <a:spcPts val="0"/>
+              </a:spcAft>
+              <a:buClrTx/>
+              <a:buSzTx/>
+              <a:buFont typeface="Arial" panose="020B0604020202020204" pitchFamily="34" charset="0"/>
+              <a:buNone/>
+              <a:tabLst/>
+              <a:defRPr/>
+            </a:pPr>
+            <a:r>
+              <a:rPr kumimoji="0" lang="ja-JP" altLang="en-US" sz="1600" b="0" i="0" u="none" strike="noStrike" kern="1200" cap="none" spc="0" normalizeH="0" baseline="0" noProof="0">
+                <a:ln>
+                  <a:noFill/>
+                </a:ln>
+                <a:solidFill>
+                  <a:prstClr val="black"/>
+                </a:solidFill>
+                <a:effectLst/>
+                <a:uLnTx/>
+                <a:uFillTx/>
+                <a:latin typeface="+mn-ea"/>
+                <a:ea typeface="Noto Sans JP"/>
+                <a:cs typeface="Fira Code" panose="020B0809050000020004" pitchFamily="49" charset="0"/>
+              </a:rPr>
+              <a:t>ビルドツールに</a:t>
+            </a:r>
+            <a:r>
+              <a:rPr kumimoji="0" lang="en-US" altLang="ja-JP" sz="1600" b="0" i="0" u="none" strike="noStrike" kern="1200" cap="none" spc="0" normalizeH="0" baseline="0" noProof="0" dirty="0">
+                <a:ln>
+                  <a:noFill/>
+                </a:ln>
+                <a:solidFill>
+                  <a:prstClr val="black"/>
+                </a:solidFill>
+                <a:effectLst/>
+                <a:uLnTx/>
+                <a:uFillTx/>
+                <a:latin typeface="+mn-ea"/>
+                <a:ea typeface="Noto Sans JP"/>
+                <a:cs typeface="Fira Code" panose="020B0809050000020004" pitchFamily="49" charset="0"/>
+              </a:rPr>
+              <a:t>Gradle</a:t>
+            </a:r>
+            <a:r>
+              <a:rPr kumimoji="0" lang="ja-JP" altLang="en-US" sz="1600" b="0" i="0" u="none" strike="noStrike" kern="1200" cap="none" spc="0" normalizeH="0" baseline="0" noProof="0">
+                <a:ln>
+                  <a:noFill/>
+                </a:ln>
+                <a:solidFill>
+                  <a:prstClr val="black"/>
+                </a:solidFill>
+                <a:effectLst/>
+                <a:uLnTx/>
+                <a:uFillTx/>
+                <a:latin typeface="+mn-ea"/>
+                <a:ea typeface="Noto Sans JP"/>
+                <a:cs typeface="Fira Code" panose="020B0809050000020004" pitchFamily="49" charset="0"/>
+              </a:rPr>
+              <a:t>が使用されており、</a:t>
+            </a:r>
+            <a:r>
+              <a:rPr kumimoji="0" lang="en-US" altLang="ja-JP" sz="1600" b="0" i="0" u="none" strike="noStrike" kern="1200" cap="none" spc="0" normalizeH="0" baseline="0" noProof="0" dirty="0">
+                <a:ln>
+                  <a:noFill/>
+                </a:ln>
+                <a:solidFill>
+                  <a:prstClr val="black"/>
+                </a:solidFill>
+                <a:effectLst/>
+                <a:uLnTx/>
+                <a:uFillTx/>
+                <a:latin typeface="+mn-ea"/>
+                <a:ea typeface="Noto Sans JP"/>
+                <a:cs typeface="Fira Code" panose="020B0809050000020004" pitchFamily="49" charset="0"/>
+              </a:rPr>
+              <a:t>Gradle</a:t>
+            </a:r>
+            <a:r>
+              <a:rPr kumimoji="0" lang="ja-JP" altLang="en-US" sz="1600" b="0" i="0" u="none" strike="noStrike" kern="1200" cap="none" spc="0" normalizeH="0" baseline="0" noProof="0">
+                <a:ln>
+                  <a:noFill/>
+                </a:ln>
+                <a:solidFill>
+                  <a:prstClr val="black"/>
+                </a:solidFill>
+                <a:effectLst/>
+                <a:uLnTx/>
+                <a:uFillTx/>
+                <a:latin typeface="+mn-ea"/>
+                <a:ea typeface="Noto Sans JP"/>
+                <a:cs typeface="Fira Code" panose="020B0809050000020004" pitchFamily="49" charset="0"/>
+              </a:rPr>
+              <a:t>経由でさまざまなビルドタスクを実行できます</a:t>
+            </a:r>
+            <a:r>
+              <a:rPr kumimoji="0" lang="en-US" altLang="ja-JP" sz="1600" b="0" i="0" u="none" strike="noStrike" kern="1200" cap="none" spc="0" normalizeH="0" baseline="0" noProof="0" dirty="0">
+                <a:ln>
+                  <a:noFill/>
+                </a:ln>
+                <a:solidFill>
+                  <a:prstClr val="black"/>
+                </a:solidFill>
+                <a:effectLst/>
+                <a:uLnTx/>
+                <a:uFillTx/>
+                <a:latin typeface="+mn-ea"/>
+                <a:ea typeface="Noto Sans JP"/>
+                <a:cs typeface="Fira Code" panose="020B0809050000020004" pitchFamily="49" charset="0"/>
+              </a:rPr>
+              <a:t>.</a:t>
+            </a:r>
+          </a:p>
+          <a:p>
+            <a:pPr marL="171450" marR="0" lvl="0" indent="-171450" algn="l" defTabSz="685800" rtl="0" eaLnBrk="1" fontAlgn="auto" latinLnBrk="0" hangingPunct="1">
+              <a:lnSpc>
+                <a:spcPct val="90000"/>
+              </a:lnSpc>
+              <a:spcBef>
+                <a:spcPts val="750"/>
+              </a:spcBef>
+              <a:spcAft>
+                <a:spcPts val="0"/>
+              </a:spcAft>
+              <a:buClrTx/>
+              <a:buSzTx/>
+              <a:buFont typeface="Arial" panose="020B0604020202020204" pitchFamily="34" charset="0"/>
+              <a:buChar char="•"/>
+              <a:tabLst/>
+              <a:defRPr/>
+            </a:pPr>
+            <a:r>
+              <a:rPr kumimoji="0" lang="en-US" altLang="ja-JP" sz="1600" b="0" i="0" u="none" strike="noStrike" kern="1200" cap="none" spc="0" normalizeH="0" baseline="0" noProof="0" dirty="0">
+                <a:ln>
+                  <a:noFill/>
+                </a:ln>
+                <a:solidFill>
+                  <a:prstClr val="black"/>
+                </a:solidFill>
+                <a:effectLst/>
+                <a:uLnTx/>
+                <a:uFillTx/>
+                <a:latin typeface="+mn-ea"/>
+                <a:ea typeface="Noto Sans JP"/>
+                <a:cs typeface="Fira Code" panose="020B0809050000020004" pitchFamily="49" charset="0"/>
+              </a:rPr>
+              <a:t>Build : </a:t>
+            </a:r>
+            <a:r>
+              <a:rPr kumimoji="0" lang="ja-JP" altLang="en-US" sz="1600" b="0" i="0" u="none" strike="noStrike" kern="1200" cap="none" spc="0" normalizeH="0" baseline="0" noProof="0">
+                <a:ln>
+                  <a:noFill/>
+                </a:ln>
+                <a:solidFill>
+                  <a:prstClr val="black"/>
+                </a:solidFill>
+                <a:effectLst/>
+                <a:uLnTx/>
+                <a:uFillTx/>
+                <a:latin typeface="+mn-ea"/>
+                <a:ea typeface="Noto Sans JP"/>
+                <a:cs typeface="Fira Code" panose="020B0809050000020004" pitchFamily="49" charset="0"/>
+              </a:rPr>
+              <a:t>ソースコードのビルドを行い</a:t>
+            </a:r>
+            <a:r>
+              <a:rPr kumimoji="0" lang="en-US" altLang="ja-JP" sz="1600" b="0" i="0" u="none" strike="noStrike" kern="1200" cap="none" spc="0" normalizeH="0" baseline="0" noProof="0" dirty="0">
+                <a:ln>
+                  <a:noFill/>
+                </a:ln>
+                <a:solidFill>
+                  <a:prstClr val="black"/>
+                </a:solidFill>
+                <a:effectLst/>
+                <a:uLnTx/>
+                <a:uFillTx/>
+                <a:latin typeface="+mn-ea"/>
+                <a:ea typeface="Noto Sans JP"/>
+                <a:cs typeface="Fira Code" panose="020B0809050000020004" pitchFamily="49" charset="0"/>
+              </a:rPr>
+              <a:t>,jar</a:t>
+            </a:r>
+            <a:r>
+              <a:rPr kumimoji="0" lang="ja-JP" altLang="en-US" sz="1600" b="0" i="0" u="none" strike="noStrike" kern="1200" cap="none" spc="0" normalizeH="0" baseline="0" noProof="0">
+                <a:ln>
+                  <a:noFill/>
+                </a:ln>
+                <a:solidFill>
+                  <a:prstClr val="black"/>
+                </a:solidFill>
+                <a:effectLst/>
+                <a:uLnTx/>
+                <a:uFillTx/>
+                <a:latin typeface="+mn-ea"/>
+                <a:ea typeface="Noto Sans JP"/>
+                <a:cs typeface="Fira Code" panose="020B0809050000020004" pitchFamily="49" charset="0"/>
+              </a:rPr>
+              <a:t>アーカイブを作成します</a:t>
+            </a:r>
+            <a:r>
+              <a:rPr kumimoji="0" lang="en-US" altLang="ja-JP" sz="1600" b="0" i="0" u="none" strike="noStrike" kern="1200" cap="none" spc="0" normalizeH="0" baseline="0" noProof="0" dirty="0">
+                <a:ln>
+                  <a:noFill/>
+                </a:ln>
+                <a:solidFill>
+                  <a:prstClr val="black"/>
+                </a:solidFill>
+                <a:effectLst/>
+                <a:uLnTx/>
+                <a:uFillTx/>
+                <a:latin typeface="+mn-ea"/>
+                <a:ea typeface="Noto Sans JP"/>
+                <a:cs typeface="Fira Code" panose="020B0809050000020004" pitchFamily="49" charset="0"/>
+              </a:rPr>
+              <a:t>.</a:t>
+            </a:r>
+            <a:r>
+              <a:rPr kumimoji="0" lang="ja-JP" altLang="en-US" sz="1600" b="0" i="0" u="none" strike="noStrike" kern="1200" cap="none" spc="0" normalizeH="0" baseline="0" noProof="0">
+                <a:ln>
+                  <a:noFill/>
+                </a:ln>
+                <a:solidFill>
+                  <a:prstClr val="black"/>
+                </a:solidFill>
+                <a:effectLst/>
+                <a:uLnTx/>
+                <a:uFillTx/>
+                <a:latin typeface="+mn-ea"/>
+                <a:ea typeface="Noto Sans JP"/>
+                <a:cs typeface="Fira Code" panose="020B0809050000020004" pitchFamily="49" charset="0"/>
+              </a:rPr>
+              <a:t>ビルドエラー等の確認に使用できます</a:t>
+            </a:r>
+            <a:r>
+              <a:rPr kumimoji="0" lang="en-US" altLang="ja-JP" sz="1600" b="0" i="0" u="none" strike="noStrike" kern="1200" cap="none" spc="0" normalizeH="0" baseline="0" noProof="0" dirty="0">
+                <a:ln>
+                  <a:noFill/>
+                </a:ln>
+                <a:solidFill>
+                  <a:prstClr val="black"/>
+                </a:solidFill>
+                <a:effectLst/>
+                <a:uLnTx/>
+                <a:uFillTx/>
+                <a:latin typeface="+mn-ea"/>
+                <a:ea typeface="Noto Sans JP"/>
+                <a:cs typeface="Fira Code" panose="020B0809050000020004" pitchFamily="49" charset="0"/>
+              </a:rPr>
+              <a:t>.</a:t>
+            </a:r>
+          </a:p>
+          <a:p>
+            <a:pPr marL="171450" marR="0" lvl="0" indent="-171450" algn="l" defTabSz="685800" rtl="0" eaLnBrk="1" fontAlgn="auto" latinLnBrk="0" hangingPunct="1">
+              <a:lnSpc>
+                <a:spcPct val="90000"/>
+              </a:lnSpc>
+              <a:spcBef>
+                <a:spcPts val="750"/>
+              </a:spcBef>
+              <a:spcAft>
+                <a:spcPts val="0"/>
+              </a:spcAft>
+              <a:buClrTx/>
+              <a:buSzTx/>
+              <a:buFont typeface="Arial" panose="020B0604020202020204" pitchFamily="34" charset="0"/>
+              <a:buChar char="•"/>
+              <a:tabLst/>
+              <a:defRPr/>
+            </a:pPr>
+            <a:r>
+              <a:rPr kumimoji="0" lang="en-US" altLang="ja-JP" sz="1600" b="0" i="0" u="none" strike="noStrike" kern="1200" cap="none" spc="0" normalizeH="0" baseline="0" noProof="0" dirty="0">
+                <a:ln>
+                  <a:noFill/>
+                </a:ln>
+                <a:solidFill>
+                  <a:prstClr val="black"/>
+                </a:solidFill>
+                <a:effectLst/>
+                <a:uLnTx/>
+                <a:uFillTx/>
+                <a:latin typeface="+mn-ea"/>
+                <a:ea typeface="Noto Sans JP"/>
+                <a:cs typeface="Fira Code" panose="020B0809050000020004" pitchFamily="49" charset="0"/>
+              </a:rPr>
+              <a:t>Clean Build : </a:t>
+            </a:r>
+            <a:r>
+              <a:rPr kumimoji="0" lang="ja-JP" altLang="en-US" sz="1600" b="0" i="0" u="none" strike="noStrike" kern="1200" cap="none" spc="0" normalizeH="0" baseline="0" noProof="0">
+                <a:ln>
+                  <a:noFill/>
+                </a:ln>
+                <a:solidFill>
+                  <a:prstClr val="black"/>
+                </a:solidFill>
+                <a:effectLst/>
+                <a:uLnTx/>
+                <a:uFillTx/>
+                <a:latin typeface="+mn-ea"/>
+                <a:ea typeface="Noto Sans JP"/>
+                <a:cs typeface="Fira Code" panose="020B0809050000020004" pitchFamily="49" charset="0"/>
+              </a:rPr>
+              <a:t>ビルドキャッシュを削除し、再度ビルドします</a:t>
+            </a:r>
+            <a:r>
+              <a:rPr kumimoji="0" lang="en-US" altLang="ja-JP" sz="1600" b="0" i="0" u="none" strike="noStrike" kern="1200" cap="none" spc="0" normalizeH="0" baseline="0" noProof="0" dirty="0">
+                <a:ln>
+                  <a:noFill/>
+                </a:ln>
+                <a:solidFill>
+                  <a:prstClr val="black"/>
+                </a:solidFill>
+                <a:effectLst/>
+                <a:uLnTx/>
+                <a:uFillTx/>
+                <a:latin typeface="+mn-ea"/>
+                <a:ea typeface="Noto Sans JP"/>
+                <a:cs typeface="Fira Code" panose="020B0809050000020004" pitchFamily="49" charset="0"/>
+              </a:rPr>
+              <a:t>. </a:t>
+            </a:r>
+            <a:r>
+              <a:rPr kumimoji="0" lang="ja-JP" altLang="en-US" sz="1600" b="0" i="0" u="none" strike="noStrike" kern="1200" cap="none" spc="0" normalizeH="0" baseline="0" noProof="0">
+                <a:ln>
+                  <a:noFill/>
+                </a:ln>
+                <a:solidFill>
+                  <a:prstClr val="black"/>
+                </a:solidFill>
+                <a:effectLst/>
+                <a:uLnTx/>
+                <a:uFillTx/>
+                <a:latin typeface="+mn-ea"/>
+                <a:ea typeface="Noto Sans JP"/>
+                <a:cs typeface="Fira Code" panose="020B0809050000020004" pitchFamily="49" charset="0"/>
+              </a:rPr>
+              <a:t>キャッシュ等に起因するエラーがある場合に使用します</a:t>
+            </a:r>
+            <a:r>
+              <a:rPr kumimoji="0" lang="en-US" altLang="ja-JP" sz="1600" b="0" i="0" u="none" strike="noStrike" kern="1200" cap="none" spc="0" normalizeH="0" baseline="0" noProof="0" dirty="0">
+                <a:ln>
+                  <a:noFill/>
+                </a:ln>
+                <a:solidFill>
+                  <a:prstClr val="black"/>
+                </a:solidFill>
+                <a:effectLst/>
+                <a:uLnTx/>
+                <a:uFillTx/>
+                <a:latin typeface="+mn-ea"/>
+                <a:ea typeface="Noto Sans JP"/>
+                <a:cs typeface="Fira Code" panose="020B0809050000020004" pitchFamily="49" charset="0"/>
+              </a:rPr>
+              <a:t>.</a:t>
+            </a:r>
+          </a:p>
+        </p:txBody>
+      </p:sp>
+      <p:sp>
+        <p:nvSpPr>
+          <p:cNvPr id="11" name="テキスト ボックス 10">
+            <a:extLst>
+              <a:ext uri="{FF2B5EF4-FFF2-40B4-BE49-F238E27FC236}">
+                <a16:creationId xmlns:a16="http://schemas.microsoft.com/office/drawing/2014/main" id="{A95086BB-92BD-1AAE-5025-751A059507D5}"/>
+              </a:ext>
+            </a:extLst>
+          </p:cNvPr>
+          <p:cNvSpPr txBox="1"/>
+          <p:nvPr/>
+        </p:nvSpPr>
+        <p:spPr>
+          <a:xfrm>
+            <a:off x="317687" y="6396283"/>
+            <a:ext cx="6284818" cy="3262816"/>
+          </a:xfrm>
+          <a:prstGeom prst="rect">
+            <a:avLst/>
+          </a:prstGeom>
+          <a:noFill/>
+        </p:spPr>
+        <p:txBody>
+          <a:bodyPr wrap="square">
+            <a:spAutoFit/>
+          </a:bodyPr>
+          <a:lstStyle/>
+          <a:p>
+            <a:pPr marL="171450" marR="0" lvl="0" indent="-171450" algn="l" defTabSz="685800" rtl="0" eaLnBrk="1" fontAlgn="auto" latinLnBrk="0" hangingPunct="1">
+              <a:lnSpc>
+                <a:spcPct val="90000"/>
+              </a:lnSpc>
+              <a:spcBef>
+                <a:spcPts val="750"/>
+              </a:spcBef>
+              <a:spcAft>
+                <a:spcPts val="0"/>
+              </a:spcAft>
+              <a:buClrTx/>
+              <a:buSzTx/>
+              <a:buFont typeface="Arial" panose="020B0604020202020204" pitchFamily="34" charset="0"/>
+              <a:buChar char="•"/>
+              <a:tabLst/>
+              <a:defRPr/>
+            </a:pPr>
+            <a:r>
+              <a:rPr kumimoji="0" lang="en-US" altLang="ja-JP" sz="1600" b="0" i="0" u="none" strike="noStrike" kern="1200" cap="none" spc="0" normalizeH="0" baseline="0" noProof="0" dirty="0">
+                <a:ln>
+                  <a:noFill/>
+                </a:ln>
+                <a:solidFill>
+                  <a:prstClr val="black"/>
+                </a:solidFill>
+                <a:effectLst/>
+                <a:uLnTx/>
+                <a:uFillTx/>
+                <a:latin typeface="+mn-ea"/>
+                <a:ea typeface="Noto Sans JP"/>
+                <a:cs typeface="Fira Code" panose="020B0809050000020004" pitchFamily="49" charset="0"/>
+              </a:rPr>
+              <a:t>Build &amp; Deploy Robot : </a:t>
+            </a:r>
+            <a:r>
+              <a:rPr kumimoji="0" lang="ja-JP" altLang="en-US" sz="1600" b="0" i="0" u="none" strike="noStrike" kern="1200" cap="none" spc="0" normalizeH="0" baseline="0" noProof="0">
+                <a:ln>
+                  <a:noFill/>
+                </a:ln>
+                <a:solidFill>
+                  <a:prstClr val="black"/>
+                </a:solidFill>
+                <a:effectLst/>
+                <a:uLnTx/>
+                <a:uFillTx/>
+                <a:latin typeface="+mn-ea"/>
+                <a:ea typeface="Noto Sans JP"/>
+                <a:cs typeface="Fira Code" panose="020B0809050000020004" pitchFamily="49" charset="0"/>
+              </a:rPr>
+              <a:t>ビルドしてロボットに実行ファイルをデプロイします</a:t>
+            </a:r>
+            <a:r>
+              <a:rPr kumimoji="0" lang="en-US" altLang="ja-JP" sz="1600" b="0" i="0" u="none" strike="noStrike" kern="1200" cap="none" spc="0" normalizeH="0" baseline="0" noProof="0" dirty="0">
+                <a:ln>
+                  <a:noFill/>
+                </a:ln>
+                <a:solidFill>
+                  <a:prstClr val="black"/>
+                </a:solidFill>
+                <a:effectLst/>
+                <a:uLnTx/>
+                <a:uFillTx/>
+                <a:latin typeface="+mn-ea"/>
+                <a:ea typeface="Noto Sans JP"/>
+                <a:cs typeface="Fira Code" panose="020B0809050000020004" pitchFamily="49" charset="0"/>
+              </a:rPr>
+              <a:t>.</a:t>
+            </a:r>
+          </a:p>
+          <a:p>
+            <a:pPr marL="171450" marR="0" lvl="0" indent="-171450" algn="l" defTabSz="685800" rtl="0" eaLnBrk="1" fontAlgn="auto" latinLnBrk="0" hangingPunct="1">
+              <a:lnSpc>
+                <a:spcPct val="90000"/>
+              </a:lnSpc>
+              <a:spcBef>
+                <a:spcPts val="750"/>
+              </a:spcBef>
+              <a:spcAft>
+                <a:spcPts val="0"/>
+              </a:spcAft>
+              <a:buClrTx/>
+              <a:buSzTx/>
+              <a:buFont typeface="Arial" panose="020B0604020202020204" pitchFamily="34" charset="0"/>
+              <a:buChar char="•"/>
+              <a:tabLst/>
+              <a:defRPr/>
+            </a:pPr>
+            <a:r>
+              <a:rPr kumimoji="0" lang="en-US" altLang="ja-JP" sz="1600" b="0" i="0" u="none" strike="noStrike" kern="1200" cap="none" spc="0" normalizeH="0" baseline="0" noProof="0" dirty="0">
+                <a:ln>
+                  <a:noFill/>
+                </a:ln>
+                <a:solidFill>
+                  <a:prstClr val="black"/>
+                </a:solidFill>
+                <a:effectLst/>
+                <a:uLnTx/>
+                <a:uFillTx/>
+                <a:latin typeface="+mn-ea"/>
+                <a:ea typeface="Noto Sans JP"/>
+                <a:cs typeface="Fira Code" panose="020B0809050000020004" pitchFamily="49" charset="0"/>
+              </a:rPr>
+              <a:t>Build &amp; Debug Robot : </a:t>
+            </a:r>
+            <a:r>
+              <a:rPr kumimoji="0" lang="ja-JP" altLang="en-US" sz="1600" b="0" i="0" u="none" strike="noStrike" kern="1200" cap="none" spc="0" normalizeH="0" baseline="0" noProof="0">
+                <a:ln>
+                  <a:noFill/>
+                </a:ln>
+                <a:solidFill>
+                  <a:prstClr val="black"/>
+                </a:solidFill>
+                <a:effectLst/>
+                <a:uLnTx/>
+                <a:uFillTx/>
+                <a:latin typeface="+mn-ea"/>
+                <a:ea typeface="Noto Sans JP"/>
+                <a:cs typeface="Fira Code" panose="020B0809050000020004" pitchFamily="49" charset="0"/>
+              </a:rPr>
+              <a:t>ビルドしてテスト用にデプロイします</a:t>
+            </a:r>
+            <a:r>
+              <a:rPr kumimoji="0" lang="en-US" altLang="ja-JP" sz="1600" b="0" i="0" u="none" strike="noStrike" kern="1200" cap="none" spc="0" normalizeH="0" baseline="0" noProof="0" dirty="0">
+                <a:ln>
+                  <a:noFill/>
+                </a:ln>
+                <a:solidFill>
+                  <a:prstClr val="black"/>
+                </a:solidFill>
+                <a:effectLst/>
+                <a:uLnTx/>
+                <a:uFillTx/>
+                <a:latin typeface="+mn-ea"/>
+                <a:ea typeface="Noto Sans JP"/>
+                <a:cs typeface="Fira Code" panose="020B0809050000020004" pitchFamily="49" charset="0"/>
+              </a:rPr>
+              <a:t>. </a:t>
+            </a:r>
+          </a:p>
+          <a:p>
+            <a:pPr marL="0" marR="0" lvl="0" indent="0" algn="l" defTabSz="685800" rtl="0" eaLnBrk="1" fontAlgn="auto" latinLnBrk="0" hangingPunct="1">
+              <a:lnSpc>
+                <a:spcPct val="90000"/>
+              </a:lnSpc>
+              <a:spcBef>
+                <a:spcPts val="750"/>
+              </a:spcBef>
+              <a:spcAft>
+                <a:spcPts val="0"/>
+              </a:spcAft>
+              <a:buClrTx/>
+              <a:buSzTx/>
+              <a:buFont typeface="Arial" panose="020B0604020202020204" pitchFamily="34" charset="0"/>
+              <a:buNone/>
+              <a:tabLst/>
+              <a:defRPr/>
+            </a:pPr>
+            <a:r>
+              <a:rPr kumimoji="0" lang="en-US" altLang="ja-JP" sz="1600" b="0" i="0" u="none" strike="noStrike" kern="1200" cap="none" spc="0" normalizeH="0" baseline="0" noProof="0" dirty="0">
+                <a:ln>
+                  <a:noFill/>
+                </a:ln>
+                <a:solidFill>
+                  <a:prstClr val="black"/>
+                </a:solidFill>
+                <a:effectLst/>
+                <a:highlight>
+                  <a:srgbClr val="778CD8"/>
+                </a:highlight>
+                <a:uLnTx/>
+                <a:uFillTx/>
+                <a:latin typeface="+mn-ea"/>
+                <a:ea typeface="Noto Sans JP"/>
+                <a:cs typeface="Fira Code" panose="020B0809050000020004" pitchFamily="49" charset="0"/>
+              </a:rPr>
+              <a:t>※</a:t>
+            </a:r>
+            <a:r>
+              <a:rPr kumimoji="0" lang="ja-JP" altLang="en-US" sz="1600" b="0" i="0" u="none" strike="noStrike" kern="1200" cap="none" spc="0" normalizeH="0" baseline="0" noProof="0">
+                <a:ln>
+                  <a:noFill/>
+                </a:ln>
+                <a:solidFill>
+                  <a:prstClr val="black"/>
+                </a:solidFill>
+                <a:effectLst/>
+                <a:highlight>
+                  <a:srgbClr val="778CD8"/>
+                </a:highlight>
+                <a:uLnTx/>
+                <a:uFillTx/>
+                <a:latin typeface="+mn-ea"/>
+                <a:ea typeface="Noto Sans JP"/>
+                <a:cs typeface="Fira Code" panose="020B0809050000020004" pitchFamily="49" charset="0"/>
+              </a:rPr>
+              <a:t>デプロイを行う場合は、ロボットの電源が</a:t>
+            </a:r>
+            <a:r>
+              <a:rPr kumimoji="0" lang="en-US" altLang="ja-JP" sz="1600" b="0" i="0" u="none" strike="noStrike" kern="1200" cap="none" spc="0" normalizeH="0" baseline="0" noProof="0" dirty="0">
+                <a:ln>
+                  <a:noFill/>
+                </a:ln>
+                <a:solidFill>
+                  <a:prstClr val="black"/>
+                </a:solidFill>
+                <a:effectLst/>
+                <a:highlight>
+                  <a:srgbClr val="778CD8"/>
+                </a:highlight>
+                <a:uLnTx/>
+                <a:uFillTx/>
+                <a:latin typeface="+mn-ea"/>
+                <a:ea typeface="Noto Sans JP"/>
+                <a:cs typeface="Fira Code" panose="020B0809050000020004" pitchFamily="49" charset="0"/>
+              </a:rPr>
+              <a:t>ON</a:t>
+            </a:r>
+            <a:r>
+              <a:rPr kumimoji="0" lang="ja-JP" altLang="en-US" sz="1600" b="0" i="0" u="none" strike="noStrike" kern="1200" cap="none" spc="0" normalizeH="0" baseline="0" noProof="0">
+                <a:ln>
+                  <a:noFill/>
+                </a:ln>
+                <a:solidFill>
+                  <a:prstClr val="black"/>
+                </a:solidFill>
+                <a:effectLst/>
+                <a:highlight>
+                  <a:srgbClr val="778CD8"/>
+                </a:highlight>
+                <a:uLnTx/>
+                <a:uFillTx/>
+                <a:latin typeface="+mn-ea"/>
+                <a:ea typeface="Noto Sans JP"/>
+                <a:cs typeface="Fira Code" panose="020B0809050000020004" pitchFamily="49" charset="0"/>
+              </a:rPr>
+              <a:t>で接続されていることを確認してください</a:t>
+            </a:r>
+            <a:r>
+              <a:rPr kumimoji="0" lang="en-US" altLang="ja-JP" sz="1600" b="0" i="0" u="none" strike="noStrike" kern="1200" cap="none" spc="0" normalizeH="0" baseline="0" noProof="0" dirty="0">
+                <a:ln>
+                  <a:noFill/>
+                </a:ln>
+                <a:solidFill>
+                  <a:prstClr val="black"/>
+                </a:solidFill>
+                <a:effectLst/>
+                <a:highlight>
+                  <a:srgbClr val="778CD8"/>
+                </a:highlight>
+                <a:uLnTx/>
+                <a:uFillTx/>
+                <a:latin typeface="+mn-ea"/>
+                <a:ea typeface="Noto Sans JP"/>
+                <a:cs typeface="Fira Code" panose="020B0809050000020004" pitchFamily="49" charset="0"/>
+              </a:rPr>
+              <a:t>(</a:t>
+            </a:r>
+            <a:r>
+              <a:rPr kumimoji="0" lang="ja-JP" altLang="en-US" sz="1600" b="0" i="0" u="none" strike="noStrike" kern="1200" cap="none" spc="0" normalizeH="0" baseline="0" noProof="0">
+                <a:ln>
+                  <a:noFill/>
+                </a:ln>
+                <a:solidFill>
+                  <a:prstClr val="black"/>
+                </a:solidFill>
+                <a:effectLst/>
+                <a:highlight>
+                  <a:srgbClr val="778CD8"/>
+                </a:highlight>
+                <a:uLnTx/>
+                <a:uFillTx/>
+                <a:latin typeface="+mn-ea"/>
+                <a:ea typeface="Noto Sans JP"/>
+                <a:cs typeface="Fira Code" panose="020B0809050000020004" pitchFamily="49" charset="0"/>
+              </a:rPr>
+              <a:t>有線、無線、</a:t>
+            </a:r>
+            <a:r>
+              <a:rPr kumimoji="0" lang="en-US" altLang="ja-JP" sz="1600" b="0" i="0" u="none" strike="noStrike" kern="1200" cap="none" spc="0" normalizeH="0" baseline="0" noProof="0" dirty="0">
+                <a:ln>
+                  <a:noFill/>
+                </a:ln>
+                <a:solidFill>
+                  <a:prstClr val="black"/>
+                </a:solidFill>
+                <a:effectLst/>
+                <a:highlight>
+                  <a:srgbClr val="778CD8"/>
+                </a:highlight>
+                <a:uLnTx/>
+                <a:uFillTx/>
+                <a:latin typeface="+mn-ea"/>
+                <a:ea typeface="Noto Sans JP"/>
+                <a:cs typeface="Fira Code" panose="020B0809050000020004" pitchFamily="49" charset="0"/>
+              </a:rPr>
+              <a:t>USB</a:t>
+            </a:r>
+            <a:r>
+              <a:rPr kumimoji="0" lang="ja-JP" altLang="en-US" sz="1600" b="0" i="0" u="none" strike="noStrike" kern="1200" cap="none" spc="0" normalizeH="0" baseline="0" noProof="0">
+                <a:ln>
+                  <a:noFill/>
+                </a:ln>
+                <a:solidFill>
+                  <a:prstClr val="black"/>
+                </a:solidFill>
+                <a:effectLst/>
+                <a:highlight>
+                  <a:srgbClr val="778CD8"/>
+                </a:highlight>
+                <a:uLnTx/>
+                <a:uFillTx/>
+                <a:latin typeface="+mn-ea"/>
+                <a:ea typeface="Noto Sans JP"/>
+                <a:cs typeface="Fira Code" panose="020B0809050000020004" pitchFamily="49" charset="0"/>
+              </a:rPr>
+              <a:t>のどれでも良い</a:t>
+            </a:r>
+            <a:r>
+              <a:rPr kumimoji="0" lang="en-US" altLang="ja-JP" sz="1600" b="0" i="0" u="none" strike="noStrike" kern="1200" cap="none" spc="0" normalizeH="0" baseline="0" noProof="0" dirty="0">
+                <a:ln>
+                  <a:noFill/>
+                </a:ln>
+                <a:solidFill>
+                  <a:prstClr val="black"/>
+                </a:solidFill>
+                <a:effectLst/>
+                <a:highlight>
+                  <a:srgbClr val="778CD8"/>
+                </a:highlight>
+                <a:uLnTx/>
+                <a:uFillTx/>
+                <a:latin typeface="+mn-ea"/>
+                <a:ea typeface="Noto Sans JP"/>
+                <a:cs typeface="Fira Code" panose="020B0809050000020004" pitchFamily="49" charset="0"/>
+              </a:rPr>
+              <a:t>). </a:t>
+            </a:r>
+            <a:r>
+              <a:rPr kumimoji="0" lang="en-US" altLang="ja-JP" sz="1600" b="0" i="0" u="none" strike="noStrike" kern="1200" cap="none" spc="0" normalizeH="0" baseline="0" noProof="0" dirty="0" err="1">
+                <a:ln>
+                  <a:noFill/>
+                </a:ln>
+                <a:solidFill>
+                  <a:prstClr val="black"/>
+                </a:solidFill>
+                <a:effectLst/>
+                <a:highlight>
+                  <a:srgbClr val="778CD8"/>
+                </a:highlight>
+                <a:uLnTx/>
+                <a:uFillTx/>
+                <a:latin typeface="+mn-ea"/>
+                <a:ea typeface="Noto Sans JP"/>
+                <a:cs typeface="Fira Code" panose="020B0809050000020004" pitchFamily="49" charset="0"/>
+              </a:rPr>
+              <a:t>DriverStation</a:t>
+            </a:r>
+            <a:r>
+              <a:rPr kumimoji="0" lang="ja-JP" altLang="en-US" sz="1600" b="0" i="0" u="none" strike="noStrike" kern="1200" cap="none" spc="0" normalizeH="0" baseline="0" noProof="0">
+                <a:ln>
+                  <a:noFill/>
+                </a:ln>
+                <a:solidFill>
+                  <a:prstClr val="black"/>
+                </a:solidFill>
+                <a:effectLst/>
+                <a:highlight>
+                  <a:srgbClr val="778CD8"/>
+                </a:highlight>
+                <a:uLnTx/>
+                <a:uFillTx/>
+                <a:latin typeface="+mn-ea"/>
+                <a:ea typeface="Noto Sans JP"/>
+                <a:cs typeface="Fira Code" panose="020B0809050000020004" pitchFamily="49" charset="0"/>
+              </a:rPr>
+              <a:t>を起動した状態でデプロイ可能です</a:t>
+            </a:r>
+            <a:r>
+              <a:rPr kumimoji="0" lang="en-US" altLang="ja-JP" sz="1600" b="0" i="0" u="none" strike="noStrike" kern="1200" cap="none" spc="0" normalizeH="0" baseline="0" noProof="0" dirty="0">
+                <a:ln>
+                  <a:noFill/>
+                </a:ln>
+                <a:solidFill>
+                  <a:prstClr val="black"/>
+                </a:solidFill>
+                <a:effectLst/>
+                <a:highlight>
+                  <a:srgbClr val="778CD8"/>
+                </a:highlight>
+                <a:uLnTx/>
+                <a:uFillTx/>
+                <a:latin typeface="+mn-ea"/>
+                <a:ea typeface="Noto Sans JP"/>
+                <a:cs typeface="Fira Code" panose="020B0809050000020004" pitchFamily="49" charset="0"/>
+              </a:rPr>
+              <a:t>.</a:t>
+            </a:r>
+            <a:endParaRPr lang="en-US" altLang="ja-JP" sz="1400" dirty="0">
+              <a:solidFill>
+                <a:prstClr val="black"/>
+              </a:solidFill>
+              <a:highlight>
+                <a:srgbClr val="778CD8"/>
+              </a:highlight>
+              <a:latin typeface="+mn-ea"/>
+              <a:ea typeface="Noto Sans JP"/>
+              <a:cs typeface="Fira Code" panose="020B0809050000020004" pitchFamily="49" charset="0"/>
+            </a:endParaRPr>
+          </a:p>
+          <a:p>
+            <a:pPr marL="0" marR="0" lvl="0" indent="0" algn="l" defTabSz="685800" rtl="0" eaLnBrk="1" fontAlgn="auto" latinLnBrk="0" hangingPunct="1">
+              <a:lnSpc>
+                <a:spcPct val="90000"/>
+              </a:lnSpc>
+              <a:spcBef>
+                <a:spcPts val="750"/>
+              </a:spcBef>
+              <a:spcAft>
+                <a:spcPts val="0"/>
+              </a:spcAft>
+              <a:buClrTx/>
+              <a:buSzTx/>
+              <a:buFont typeface="Arial" panose="020B0604020202020204" pitchFamily="34" charset="0"/>
+              <a:buNone/>
+              <a:tabLst/>
+              <a:defRPr/>
+            </a:pPr>
+            <a:endParaRPr lang="en-US" altLang="ja-JP" sz="1600" b="1" dirty="0">
+              <a:latin typeface="+mn-ea"/>
+              <a:cs typeface="Fira Code" panose="020B0809050000020004" pitchFamily="49" charset="0"/>
+            </a:endParaRPr>
+          </a:p>
+          <a:p>
+            <a:pPr marL="0" indent="0">
+              <a:buNone/>
+            </a:pPr>
+            <a:r>
+              <a:rPr lang="ja-JP" altLang="en-US" sz="1600" b="1">
+                <a:latin typeface="+mn-ea"/>
+                <a:cs typeface="Fira Code" panose="020B0809050000020004" pitchFamily="49" charset="0"/>
+              </a:rPr>
+              <a:t>タスクの実行方法</a:t>
+            </a:r>
+            <a:endParaRPr lang="en-US" altLang="ja-JP" sz="1600" b="1" dirty="0">
+              <a:latin typeface="+mn-ea"/>
+              <a:cs typeface="Fira Code" panose="020B0809050000020004" pitchFamily="49" charset="0"/>
+            </a:endParaRPr>
+          </a:p>
+          <a:p>
+            <a:pPr marL="0" indent="0">
+              <a:buNone/>
+            </a:pPr>
+            <a:r>
+              <a:rPr lang="ja-JP" altLang="en-US" sz="1600">
+                <a:latin typeface="+mn-ea"/>
+                <a:cs typeface="Fira Code" panose="020B0809050000020004" pitchFamily="49" charset="0"/>
+              </a:rPr>
+              <a:t>実行するタスクを選び，開始ボタンをクリックしてタスクの実行を開始します</a:t>
+            </a:r>
+            <a:r>
+              <a:rPr lang="en-US" altLang="ja-JP" sz="1600" dirty="0">
+                <a:latin typeface="+mn-ea"/>
+                <a:cs typeface="Fira Code" panose="020B0809050000020004" pitchFamily="49" charset="0"/>
+              </a:rPr>
+              <a:t>.</a:t>
+            </a:r>
+          </a:p>
+          <a:p>
+            <a:pPr marL="0" indent="0">
+              <a:buNone/>
+            </a:pPr>
+            <a:r>
+              <a:rPr lang="en-US" altLang="ja-JP" sz="1600" dirty="0" err="1">
+                <a:latin typeface="+mn-ea"/>
+                <a:cs typeface="Fira Code" panose="020B0809050000020004" pitchFamily="49" charset="0"/>
+              </a:rPr>
+              <a:t>VSCode</a:t>
+            </a:r>
+            <a:r>
+              <a:rPr lang="ja-JP" altLang="en-US" sz="1600">
+                <a:latin typeface="+mn-ea"/>
+                <a:cs typeface="Fira Code" panose="020B0809050000020004" pitchFamily="49" charset="0"/>
+              </a:rPr>
+              <a:t>の場合は</a:t>
+            </a:r>
+            <a:r>
+              <a:rPr lang="en-US" altLang="ja-JP" sz="1600" dirty="0">
+                <a:latin typeface="+mn-ea"/>
+                <a:cs typeface="Fira Code" panose="020B0809050000020004" pitchFamily="49" charset="0"/>
+              </a:rPr>
+              <a:t>, </a:t>
+            </a:r>
+            <a:r>
+              <a:rPr lang="en-US" altLang="ja-JP" sz="1600" dirty="0" err="1">
+                <a:latin typeface="+mn-ea"/>
+                <a:cs typeface="Fira Code" panose="020B0809050000020004" pitchFamily="49" charset="0"/>
+              </a:rPr>
+              <a:t>WPILib</a:t>
+            </a:r>
+            <a:r>
+              <a:rPr lang="ja-JP" altLang="en-US" sz="1600">
+                <a:latin typeface="+mn-ea"/>
+                <a:cs typeface="Fira Code" panose="020B0809050000020004" pitchFamily="49" charset="0"/>
+              </a:rPr>
+              <a:t>拡張機能アイコンから実行できます</a:t>
+            </a:r>
+            <a:r>
+              <a:rPr lang="en-US" altLang="ja-JP" sz="1600" dirty="0">
+                <a:latin typeface="+mn-ea"/>
+                <a:cs typeface="Fira Code" panose="020B0809050000020004" pitchFamily="49" charset="0"/>
+              </a:rPr>
+              <a:t>.</a:t>
+            </a:r>
+          </a:p>
+          <a:p>
+            <a:pPr marL="0" marR="0" lvl="0" indent="0" algn="l" defTabSz="685800" rtl="0" eaLnBrk="1" fontAlgn="auto" latinLnBrk="0" hangingPunct="1">
+              <a:lnSpc>
+                <a:spcPct val="90000"/>
+              </a:lnSpc>
+              <a:spcBef>
+                <a:spcPts val="750"/>
+              </a:spcBef>
+              <a:spcAft>
+                <a:spcPts val="0"/>
+              </a:spcAft>
+              <a:buClrTx/>
+              <a:buSzTx/>
+              <a:buFont typeface="Arial" panose="020B0604020202020204" pitchFamily="34" charset="0"/>
+              <a:buNone/>
+              <a:tabLst/>
+              <a:defRPr/>
+            </a:pPr>
+            <a:endParaRPr kumimoji="0" lang="en-US" altLang="ja-JP" sz="1600" b="0" i="0" u="none" strike="noStrike" kern="1200" cap="none" spc="0" normalizeH="0" baseline="0" noProof="0" dirty="0">
+              <a:ln>
+                <a:noFill/>
+              </a:ln>
+              <a:solidFill>
+                <a:prstClr val="black"/>
+              </a:solidFill>
+              <a:effectLst/>
+              <a:highlight>
+                <a:srgbClr val="778CD8"/>
+              </a:highlight>
+              <a:uLnTx/>
+              <a:uFillTx/>
+              <a:latin typeface="+mn-ea"/>
+              <a:ea typeface="Noto Sans JP"/>
+              <a:cs typeface="Fira Code" panose="020B0809050000020004" pitchFamily="49" charset="0"/>
+            </a:endParaRPr>
+          </a:p>
+        </p:txBody>
+      </p:sp>
+      <p:pic>
+        <p:nvPicPr>
+          <p:cNvPr id="12" name="図 11">
+            <a:extLst>
+              <a:ext uri="{FF2B5EF4-FFF2-40B4-BE49-F238E27FC236}">
+                <a16:creationId xmlns:a16="http://schemas.microsoft.com/office/drawing/2014/main" id="{203C869A-4DB6-0B5D-7F48-7F51C5A220CC}"/>
+              </a:ext>
+            </a:extLst>
+          </p:cNvPr>
+          <p:cNvPicPr>
+            <a:picLocks noChangeAspect="1"/>
+          </p:cNvPicPr>
+          <p:nvPr/>
+        </p:nvPicPr>
+        <p:blipFill>
+          <a:blip r:embed="rId4"/>
+          <a:stretch>
+            <a:fillRect/>
+          </a:stretch>
+        </p:blipFill>
+        <p:spPr>
+          <a:xfrm>
+            <a:off x="4555980" y="9020842"/>
+            <a:ext cx="2046525" cy="378652"/>
+          </a:xfrm>
+          <a:prstGeom prst="rect">
+            <a:avLst/>
+          </a:prstGeom>
+        </p:spPr>
+      </p:pic>
+    </p:spTree>
+    <p:extLst>
+      <p:ext uri="{BB962C8B-B14F-4D97-AF65-F5344CB8AC3E}">
         <p14:creationId xmlns:p14="http://schemas.microsoft.com/office/powerpoint/2010/main" val="3012554416"/>
+      </p:ext>
+    </p:extLst>
+  </p:cSld>
+  <p:clrMapOvr>
+    <a:masterClrMapping/>
+  </p:clrMapOvr>
+</p:sld>
+</file>
+
+<file path=ppt/slides/slide7.xml><?xml version="1.0" encoding="utf-8"?>
+<p:sld xmlns:a="http://schemas.openxmlformats.org/drawingml/2006/main" xmlns:r="http://schemas.openxmlformats.org/officeDocument/2006/relationships" xmlns:p="http://schemas.openxmlformats.org/presentationml/2006/main">
+  <p:cSld>
+    <p:spTree>
+      <p:nvGrpSpPr>
+        <p:cNvPr id="1" name="">
+          <a:extLst>
+            <a:ext uri="{FF2B5EF4-FFF2-40B4-BE49-F238E27FC236}">
+              <a16:creationId xmlns:a16="http://schemas.microsoft.com/office/drawing/2014/main" id="{F8931A15-F644-DB73-327A-DAC617585AE5}"/>
+            </a:ext>
+          </a:extLst>
+        </p:cNvPr>
+        <p:cNvGrpSpPr/>
+        <p:nvPr/>
+      </p:nvGrpSpPr>
+      <p:grpSpPr>
+        <a:xfrm>
+          <a:off x="0" y="0"/>
+          <a:ext cx="0" cy="0"/>
+          <a:chOff x="0" y="0"/>
+          <a:chExt cx="0" cy="0"/>
+        </a:xfrm>
+      </p:grpSpPr>
+      <p:sp>
+        <p:nvSpPr>
+          <p:cNvPr id="2" name="タイトル 1">
+            <a:extLst>
+              <a:ext uri="{FF2B5EF4-FFF2-40B4-BE49-F238E27FC236}">
+                <a16:creationId xmlns:a16="http://schemas.microsoft.com/office/drawing/2014/main" id="{DE8D286E-E560-C7F2-D059-AC8B2B78C138}"/>
+              </a:ext>
+            </a:extLst>
+          </p:cNvPr>
+          <p:cNvSpPr>
+            <a:spLocks noGrp="1"/>
+          </p:cNvSpPr>
+          <p:nvPr>
+            <p:ph type="title"/>
+          </p:nvPr>
+        </p:nvSpPr>
+        <p:spPr>
+          <a:xfrm>
+            <a:off x="255494" y="406382"/>
+            <a:ext cx="6347011" cy="456315"/>
+          </a:xfrm>
+        </p:spPr>
+        <p:txBody>
+          <a:bodyPr>
+            <a:normAutofit fontScale="90000"/>
+          </a:bodyPr>
+          <a:lstStyle/>
+          <a:p>
+            <a:r>
+              <a:rPr lang="ja-JP" altLang="en-US"/>
+              <a:t>コードのビルド</a:t>
+            </a:r>
+            <a:r>
+              <a:rPr lang="en-US" altLang="ja-JP" dirty="0"/>
+              <a:t>/</a:t>
+            </a:r>
+            <a:r>
+              <a:rPr lang="ja-JP" altLang="en-US"/>
+              <a:t>デプロイ</a:t>
+            </a:r>
+            <a:endParaRPr lang="LID4096" dirty="0"/>
+          </a:p>
+        </p:txBody>
+      </p:sp>
+      <p:sp>
+        <p:nvSpPr>
+          <p:cNvPr id="4" name="スライド番号プレースホルダー 3">
+            <a:extLst>
+              <a:ext uri="{FF2B5EF4-FFF2-40B4-BE49-F238E27FC236}">
+                <a16:creationId xmlns:a16="http://schemas.microsoft.com/office/drawing/2014/main" id="{A605DC03-8CF0-D51D-9FA8-76DDF31F2AC2}"/>
+              </a:ext>
+            </a:extLst>
+          </p:cNvPr>
+          <p:cNvSpPr>
+            <a:spLocks noGrp="1"/>
+          </p:cNvSpPr>
+          <p:nvPr>
+            <p:ph type="sldNum" sz="quarter" idx="12"/>
+          </p:nvPr>
+        </p:nvSpPr>
+        <p:spPr>
+          <a:xfrm>
+            <a:off x="2657475" y="9399494"/>
+            <a:ext cx="1543050" cy="403412"/>
+          </a:xfrm>
+        </p:spPr>
+        <p:txBody>
+          <a:bodyPr/>
+          <a:lstStyle/>
+          <a:p>
+            <a:pPr algn="ctr"/>
+            <a:fld id="{1B7D4A80-9DE4-4993-AAB5-84F5BA439461}" type="slidenum">
+              <a:rPr lang="LID4096" sz="1400" smtClean="0"/>
+              <a:pPr algn="ctr"/>
+              <a:t>7</a:t>
+            </a:fld>
+            <a:endParaRPr lang="LID4096" sz="1400" dirty="0"/>
+          </a:p>
+        </p:txBody>
+      </p:sp>
+      <p:sp>
+        <p:nvSpPr>
+          <p:cNvPr id="6" name="コンテンツ プレースホルダー 5">
+            <a:extLst>
+              <a:ext uri="{FF2B5EF4-FFF2-40B4-BE49-F238E27FC236}">
+                <a16:creationId xmlns:a16="http://schemas.microsoft.com/office/drawing/2014/main" id="{E480CBF6-F224-A0E4-4F84-7C4D4FFD96AA}"/>
+              </a:ext>
+            </a:extLst>
+          </p:cNvPr>
+          <p:cNvSpPr>
+            <a:spLocks noGrp="1"/>
+          </p:cNvSpPr>
+          <p:nvPr>
+            <p:ph idx="1"/>
+          </p:nvPr>
+        </p:nvSpPr>
+        <p:spPr>
+          <a:xfrm>
+            <a:off x="317687" y="1009744"/>
+            <a:ext cx="6284818" cy="8389749"/>
+          </a:xfrm>
+        </p:spPr>
+        <p:txBody>
+          <a:bodyPr>
+            <a:normAutofit/>
+          </a:bodyPr>
+          <a:lstStyle/>
+          <a:p>
+            <a:pPr marL="0" indent="0">
+              <a:buNone/>
+            </a:pPr>
+            <a:endParaRPr lang="en-US" altLang="ja-JP" sz="1800" dirty="0">
+              <a:latin typeface="+mn-ea"/>
+              <a:cs typeface="Fira Code" panose="020B0809050000020004" pitchFamily="49" charset="0"/>
+            </a:endParaRPr>
+          </a:p>
+        </p:txBody>
+      </p:sp>
+    </p:spTree>
+    <p:extLst>
+      <p:ext uri="{BB962C8B-B14F-4D97-AF65-F5344CB8AC3E}">
+        <p14:creationId xmlns:p14="http://schemas.microsoft.com/office/powerpoint/2010/main" val="2164686030"/>
       </p:ext>
     </p:extLst>
   </p:cSld>

</xml_diff>